<commit_message>
updated slides to clarify behavior of await
</commit_message>
<xml_diff>
--- a/Slides/Module 05 Concurrency Patterns in Typescript.pptx
+++ b/Slides/Module 05 Concurrency Patterns in Typescript.pptx
@@ -817,29 +817,7 @@
           <a:p>
             <a:r>
               <a:rPr lang="en-US" dirty="0"/>
-              <a:t>We should leverage concurrency whenever possible. Again, in this example, it seems like it’s probably OK to make all of the requests at once, and then wait for the responses.</a:t>
-            </a:r>
-          </a:p>
-          <a:p>
-            <a:endParaRPr lang="en-US" dirty="0"/>
-          </a:p>
-          <a:p>
-            <a:r>
-              <a:rPr lang="en-US" dirty="0"/>
-              <a:t>Multiple “awaits” on left means (read slide)</a:t>
-            </a:r>
-          </a:p>
-          <a:p>
-            <a:endParaRPr lang="en-US" dirty="0"/>
-          </a:p>
-          <a:p>
-            <a:r>
-              <a:rPr lang="en-US" dirty="0" err="1"/>
-              <a:t>Promise.all</a:t>
-            </a:r>
-            <a:r>
-              <a:rPr lang="en-US" dirty="0"/>
-              <a:t> on right means (read slide)</a:t>
+              <a:t>Here all three requests are sent out concurrently.  </a:t>
             </a:r>
           </a:p>
         </p:txBody>
@@ -847,7 +825,7 @@
     </p:spTree>
     <p:extLst>
       <p:ext uri="{BB962C8B-B14F-4D97-AF65-F5344CB8AC3E}">
-        <p14:creationId xmlns:p14="http://schemas.microsoft.com/office/powerpoint/2010/main" val="2468432417"/>
+        <p14:creationId xmlns:p14="http://schemas.microsoft.com/office/powerpoint/2010/main" val="3329866587"/>
       </p:ext>
     </p:extLst>
   </p:cSld>
@@ -903,7 +881,7 @@
           <a:p>
             <a:r>
               <a:rPr lang="en-US" dirty="0"/>
-              <a:t>Concurrency lets us mask latency. </a:t>
+              <a:t>We should leverage concurrency whenever possible. Again, in this example, it seems like it’s probably OK to make all of the requests at once, and then wait for the responses.</a:t>
             </a:r>
           </a:p>
           <a:p>
@@ -912,39 +890,20 @@
           <a:p>
             <a:r>
               <a:rPr lang="en-US" dirty="0"/>
-              <a:t>Well-written asynchronous code leverages concurrency when possible.</a:t>
-            </a:r>
-          </a:p>
-          <a:p>
+              <a:t>Multiple “awaits” on left means (read slide)</a:t>
+            </a:r>
+          </a:p>
+          <a:p>
+            <a:endParaRPr lang="en-US" dirty="0"/>
+          </a:p>
+          <a:p>
+            <a:r>
+              <a:rPr lang="en-US" dirty="0" err="1"/>
+              <a:t>Promise.all</a:t>
+            </a:r>
             <a:r>
               <a:rPr lang="en-US" dirty="0"/>
-              <a:t>If you have a bunch of things that can be done at the same time, say, making 3 requests to servers, and you don’t care the order in which those requests are made, then do not write code that enforces any ordering. The example on the right will produce output that might have a different order than the one on the left, but if we are OK with that, we can mask how slow that I/O is by doing things concurrently.</a:t>
-            </a:r>
-          </a:p>
-          <a:p>
-            <a:endParaRPr lang="en-US" dirty="0"/>
-          </a:p>
-          <a:p>
-            <a:r>
-              <a:rPr lang="en-US" dirty="0"/>
-              <a:t>(Click through builds to see the sequence of operations. The * stands in for </a:t>
-            </a:r>
-            <a:r>
-              <a:rPr lang="en-US" dirty="0" err="1"/>
-              <a:t>console.log</a:t>
-            </a:r>
-            <a:r>
-              <a:rPr lang="en-US" dirty="0"/>
-              <a:t>, boxes are not to-scale. Notice how on the concurrent one the results got printed as 3,2,1.</a:t>
-            </a:r>
-          </a:p>
-          <a:p>
-            <a:endParaRPr lang="en-US" dirty="0"/>
-          </a:p>
-          <a:p>
-            <a:r>
-              <a:rPr lang="en-US" dirty="0"/>
-              <a:t>In this simple example the performance difference is a small absolute number (130msec), but another way of saying it is that the code on the left is 3x slower!</a:t>
+              <a:t> on right means (read slide)</a:t>
             </a:r>
           </a:p>
         </p:txBody>
@@ -952,7 +911,7 @@
     </p:spTree>
     <p:extLst>
       <p:ext uri="{BB962C8B-B14F-4D97-AF65-F5344CB8AC3E}">
-        <p14:creationId xmlns:p14="http://schemas.microsoft.com/office/powerpoint/2010/main" val="3672567741"/>
+        <p14:creationId xmlns:p14="http://schemas.microsoft.com/office/powerpoint/2010/main" val="2468432417"/>
       </p:ext>
     </p:extLst>
   </p:cSld>
@@ -1008,7 +967,7 @@
           <a:p>
             <a:r>
               <a:rPr lang="en-US" dirty="0"/>
-              <a:t>For the rest of this lesson, we’ll look at a more interesting example, where we will make multiple requests to a web service. This slide documents the operations that this web service supports. </a:t>
+              <a:t>Concurrency lets us mask latency. </a:t>
             </a:r>
           </a:p>
           <a:p>
@@ -1017,7 +976,39 @@
           <a:p>
             <a:r>
               <a:rPr lang="en-US" dirty="0"/>
-              <a:t>For now, the important part to understand is that this is a service that tracks student transcripts. It supports creating new transcripts, fetching a student’s transcript by the student’s ID, and listing the students in the system.</a:t>
+              <a:t>Well-written asynchronous code leverages concurrency when possible.</a:t>
+            </a:r>
+          </a:p>
+          <a:p>
+            <a:r>
+              <a:rPr lang="en-US" dirty="0"/>
+              <a:t>If you have a bunch of things that can be done at the same time, say, making 3 requests to servers, and you don’t care the order in which those requests are made, then do not write code that enforces any ordering. The example on the right will produce output that might have a different order than the one on the left, but if we are OK with that, we can mask how slow that I/O is by doing things concurrently.</a:t>
+            </a:r>
+          </a:p>
+          <a:p>
+            <a:endParaRPr lang="en-US" dirty="0"/>
+          </a:p>
+          <a:p>
+            <a:r>
+              <a:rPr lang="en-US" dirty="0"/>
+              <a:t>(Click through builds to see the sequence of operations. The * stands in for </a:t>
+            </a:r>
+            <a:r>
+              <a:rPr lang="en-US" dirty="0" err="1"/>
+              <a:t>console.log</a:t>
+            </a:r>
+            <a:r>
+              <a:rPr lang="en-US" dirty="0"/>
+              <a:t>, boxes are not to-scale. Notice how on the concurrent one the results got printed as 3,2,1.</a:t>
+            </a:r>
+          </a:p>
+          <a:p>
+            <a:endParaRPr lang="en-US" dirty="0"/>
+          </a:p>
+          <a:p>
+            <a:r>
+              <a:rPr lang="en-US" dirty="0"/>
+              <a:t>In this simple example the performance difference is a small absolute number (130msec), but another way of saying it is that the code on the left is 3x slower!</a:t>
             </a:r>
           </a:p>
         </p:txBody>
@@ -1025,7 +1016,7 @@
     </p:spTree>
     <p:extLst>
       <p:ext uri="{BB962C8B-B14F-4D97-AF65-F5344CB8AC3E}">
-        <p14:creationId xmlns:p14="http://schemas.microsoft.com/office/powerpoint/2010/main" val="1493980668"/>
+        <p14:creationId xmlns:p14="http://schemas.microsoft.com/office/powerpoint/2010/main" val="3672567741"/>
       </p:ext>
     </p:extLst>
   </p:cSld>
@@ -1079,14 +1070,26 @@
           <a:bodyPr/>
           <a:lstStyle/>
           <a:p>
+            <a:r>
+              <a:rPr lang="en-US" dirty="0"/>
+              <a:t>For the rest of this lesson, we’ll look at a more interesting example, where we will make multiple requests to a web service. This slide documents the operations that this web service supports. </a:t>
+            </a:r>
+          </a:p>
+          <a:p>
             <a:endParaRPr lang="en-US" dirty="0"/>
+          </a:p>
+          <a:p>
+            <a:r>
+              <a:rPr lang="en-US" dirty="0"/>
+              <a:t>For now, the important part to understand is that this is a service that tracks student transcripts. It supports creating new transcripts, fetching a student’s transcript by the student’s ID, and listing the students in the system.</a:t>
+            </a:r>
           </a:p>
         </p:txBody>
       </p:sp>
     </p:spTree>
     <p:extLst>
       <p:ext uri="{BB962C8B-B14F-4D97-AF65-F5344CB8AC3E}">
-        <p14:creationId xmlns:p14="http://schemas.microsoft.com/office/powerpoint/2010/main" val="993467052"/>
+        <p14:creationId xmlns:p14="http://schemas.microsoft.com/office/powerpoint/2010/main" val="1493980668"/>
       </p:ext>
     </p:extLst>
   </p:cSld>
@@ -1140,25 +1143,14 @@
           <a:bodyPr/>
           <a:lstStyle/>
           <a:p>
-            <a:r>
-              <a:rPr lang="en-US" dirty="0"/>
-              <a:t>For each student, we’ll need to fetch the transcript.  This is an http request, so we do it asynchronously.   First, we describe the promise we’d like to make for this student.  The promise is to call </a:t>
-            </a:r>
-            <a:r>
-              <a:rPr lang="en-US" dirty="0" err="1"/>
-              <a:t>axios</a:t>
-            </a:r>
-            <a:r>
-              <a:rPr lang="en-US" dirty="0"/>
-              <a:t> and wait for the result.</a:t>
-            </a:r>
+            <a:endParaRPr lang="en-US" dirty="0"/>
           </a:p>
         </p:txBody>
       </p:sp>
     </p:spTree>
     <p:extLst>
       <p:ext uri="{BB962C8B-B14F-4D97-AF65-F5344CB8AC3E}">
-        <p14:creationId xmlns:p14="http://schemas.microsoft.com/office/powerpoint/2010/main" val="1593653360"/>
+        <p14:creationId xmlns:p14="http://schemas.microsoft.com/office/powerpoint/2010/main" val="993467052"/>
       </p:ext>
     </p:extLst>
   </p:cSld>
@@ -1212,14 +1204,25 @@
           <a:bodyPr/>
           <a:lstStyle/>
           <a:p>
-            <a:endParaRPr lang="en-US" dirty="0"/>
+            <a:r>
+              <a:rPr lang="en-US" dirty="0"/>
+              <a:t>For each student, we’ll need to fetch the transcript.  This is an http request, so we do it asynchronously.   First, we describe the promise we’d like to make for this student.  The promise is to call </a:t>
+            </a:r>
+            <a:r>
+              <a:rPr lang="en-US" dirty="0" err="1"/>
+              <a:t>axios</a:t>
+            </a:r>
+            <a:r>
+              <a:rPr lang="en-US" dirty="0"/>
+              <a:t> and wait for the result.</a:t>
+            </a:r>
           </a:p>
         </p:txBody>
       </p:sp>
     </p:spTree>
     <p:extLst>
       <p:ext uri="{BB962C8B-B14F-4D97-AF65-F5344CB8AC3E}">
-        <p14:creationId xmlns:p14="http://schemas.microsoft.com/office/powerpoint/2010/main" val="3778395246"/>
+        <p14:creationId xmlns:p14="http://schemas.microsoft.com/office/powerpoint/2010/main" val="1593653360"/>
       </p:ext>
     </p:extLst>
   </p:cSld>
@@ -1273,37 +1276,6 @@
           <a:bodyPr/>
           <a:lstStyle/>
           <a:p>
-            <a:pPr marL="0" marR="0" lvl="0" indent="0" defTabSz="228600" eaLnBrk="1" fontAlgn="auto" latinLnBrk="0" hangingPunct="1">
-              <a:lnSpc>
-                <a:spcPct val="117999"/>
-              </a:lnSpc>
-              <a:spcBef>
-                <a:spcPts val="0"/>
-              </a:spcBef>
-              <a:spcAft>
-                <a:spcPts val="0"/>
-              </a:spcAft>
-              <a:buClrTx/>
-              <a:buSzTx/>
-              <a:buFontTx/>
-              <a:buNone/>
-              <a:tabLst/>
-              <a:defRPr/>
-            </a:pPr>
-            <a:r>
-              <a:rPr lang="en-US" dirty="0"/>
-              <a:t>.This pattern of taking an array of stuff and ‘</a:t>
-            </a:r>
-            <a:r>
-              <a:rPr lang="en-US" dirty="0" err="1"/>
-              <a:t>map’ing</a:t>
-            </a:r>
-            <a:r>
-              <a:rPr lang="en-US" dirty="0"/>
-              <a:t> it to promises is extremely common and valuable – you should write this down. </a:t>
-            </a:r>
-          </a:p>
-          <a:p>
             <a:endParaRPr lang="en-US" dirty="0"/>
           </a:p>
         </p:txBody>
@@ -1311,7 +1283,7 @@
     </p:spTree>
     <p:extLst>
       <p:ext uri="{BB962C8B-B14F-4D97-AF65-F5344CB8AC3E}">
-        <p14:creationId xmlns:p14="http://schemas.microsoft.com/office/powerpoint/2010/main" val="2913346644"/>
+        <p14:creationId xmlns:p14="http://schemas.microsoft.com/office/powerpoint/2010/main" val="3778395246"/>
       </p:ext>
     </p:extLst>
   </p:cSld>
@@ -1365,17 +1337,45 @@
           <a:bodyPr/>
           <a:lstStyle/>
           <a:p>
+            <a:pPr marL="0" marR="0" lvl="0" indent="0" defTabSz="228600" eaLnBrk="1" fontAlgn="auto" latinLnBrk="0" hangingPunct="1">
+              <a:lnSpc>
+                <a:spcPct val="117999"/>
+              </a:lnSpc>
+              <a:spcBef>
+                <a:spcPts val="0"/>
+              </a:spcBef>
+              <a:spcAft>
+                <a:spcPts val="0"/>
+              </a:spcAft>
+              <a:buClrTx/>
+              <a:buSzTx/>
+              <a:buFontTx/>
+              <a:buNone/>
+              <a:tabLst/>
+              <a:defRPr/>
+            </a:pPr>
             <a:r>
               <a:rPr lang="en-US" dirty="0"/>
-              <a:t>Here’s our mapping pattern again:  We take an array, map it to promises, and wait for all of them to finish.   This is how we start lots of jobs asynchronously.</a:t>
-            </a:r>
+              <a:t>.This pattern of taking an array of stuff and ‘</a:t>
+            </a:r>
+            <a:r>
+              <a:rPr lang="en-US" dirty="0" err="1"/>
+              <a:t>map’ing</a:t>
+            </a:r>
+            <a:r>
+              <a:rPr lang="en-US" dirty="0"/>
+              <a:t> it to promises is extremely common and valuable – you should write this down. </a:t>
+            </a:r>
+          </a:p>
+          <a:p>
+            <a:endParaRPr lang="en-US" dirty="0"/>
           </a:p>
         </p:txBody>
       </p:sp>
     </p:spTree>
     <p:extLst>
       <p:ext uri="{BB962C8B-B14F-4D97-AF65-F5344CB8AC3E}">
-        <p14:creationId xmlns:p14="http://schemas.microsoft.com/office/powerpoint/2010/main" val="1575106418"/>
+        <p14:creationId xmlns:p14="http://schemas.microsoft.com/office/powerpoint/2010/main" val="2913346644"/>
       </p:ext>
     </p:extLst>
   </p:cSld>
@@ -1429,14 +1429,17 @@
           <a:bodyPr/>
           <a:lstStyle/>
           <a:p>
-            <a:endParaRPr lang="en-US" dirty="0"/>
+            <a:r>
+              <a:rPr lang="en-US" dirty="0"/>
+              <a:t>Here’s our mapping pattern again:  We take an array, map it to promises, and wait for all of them to finish.   This is how we start lots of jobs asynchronously.</a:t>
+            </a:r>
           </a:p>
         </p:txBody>
       </p:sp>
     </p:spTree>
     <p:extLst>
       <p:ext uri="{BB962C8B-B14F-4D97-AF65-F5344CB8AC3E}">
-        <p14:creationId xmlns:p14="http://schemas.microsoft.com/office/powerpoint/2010/main" val="1539856872"/>
+        <p14:creationId xmlns:p14="http://schemas.microsoft.com/office/powerpoint/2010/main" val="1575106418"/>
       </p:ext>
     </p:extLst>
   </p:cSld>
@@ -1465,7 +1468,7 @@
       </p:grpSpPr>
       <p:sp>
         <p:nvSpPr>
-          <p:cNvPr id="632" name="Shape 632"/>
+          <p:cNvPr id="2" name="Slide Image Placeholder 1"/>
           <p:cNvSpPr>
             <a:spLocks noGrp="1" noRot="1" noChangeAspect="1"/>
           </p:cNvSpPr>
@@ -1473,158 +1476,31 @@
             <p:ph type="sldImg"/>
           </p:nvPr>
         </p:nvSpPr>
-        <p:spPr>
-          <a:prstGeom prst="rect">
-            <a:avLst/>
-          </a:prstGeom>
-        </p:spPr>
-        <p:txBody>
-          <a:bodyPr/>
-          <a:lstStyle/>
-          <a:p>
-            <a:endParaRPr/>
-          </a:p>
-        </p:txBody>
+        <p:spPr/>
       </p:sp>
       <p:sp>
         <p:nvSpPr>
-          <p:cNvPr id="633" name="Shape 633"/>
+          <p:cNvPr id="3" name="Notes Placeholder 2"/>
           <p:cNvSpPr>
             <a:spLocks noGrp="1"/>
           </p:cNvSpPr>
           <p:nvPr>
-            <p:ph type="body" sz="quarter" idx="1"/>
+            <p:ph type="body" idx="1"/>
           </p:nvPr>
         </p:nvSpPr>
-        <p:spPr>
-          <a:prstGeom prst="rect">
-            <a:avLst/>
-          </a:prstGeom>
-        </p:spPr>
+        <p:spPr/>
         <p:txBody>
           <a:bodyPr/>
           <a:lstStyle/>
           <a:p>
-            <a:r>
-              <a:rPr lang="en-US" dirty="0"/>
-              <a:t>Why is that concurrency important?</a:t>
-            </a:r>
-          </a:p>
-          <a:p>
-            <a:r>
-              <a:rPr lang="en-US" dirty="0"/>
-              <a:t>Here’s another implementation of those same tasks, which is functionally equivalent. But, there is a subtle difference in how they run.</a:t>
-            </a:r>
-          </a:p>
-          <a:p>
             <a:endParaRPr lang="en-US" dirty="0"/>
-          </a:p>
-          <a:p>
-            <a:r>
-              <a:rPr lang="en-US" dirty="0"/>
-              <a:t>(Build) In the code that we built up on the past slides, we create an async task for each student to fetch the transcript.</a:t>
-            </a:r>
-          </a:p>
-          <a:p>
-            <a:endParaRPr lang="en-US" dirty="0"/>
-          </a:p>
-          <a:p>
-            <a:r>
-              <a:rPr lang="en-US" dirty="0"/>
-              <a:t>(Build) In the code on the bottom, we have a single handler. It gets the first student’s transcript. THEN it gets the second, THEN the third, etc. This prevents concurrency: can’t fetch multiple things at once. Same story for the rest of the code – checking the size of each JSON file</a:t>
-            </a:r>
-          </a:p>
-          <a:p>
-            <a:endParaRPr lang="en-US" dirty="0"/>
-          </a:p>
-          <a:p>
-            <a:pPr marL="0" marR="0" lvl="0" indent="0" defTabSz="228600" eaLnBrk="1" fontAlgn="auto" latinLnBrk="0" hangingPunct="1">
-              <a:lnSpc>
-                <a:spcPct val="117999"/>
-              </a:lnSpc>
-              <a:spcBef>
-                <a:spcPts val="0"/>
-              </a:spcBef>
-              <a:spcAft>
-                <a:spcPts val="0"/>
-              </a:spcAft>
-              <a:buClrTx/>
-              <a:buSzTx/>
-              <a:buFontTx/>
-              <a:buNone/>
-              <a:tabLst/>
-              <a:defRPr/>
-            </a:pPr>
-            <a:r>
-              <a:rPr lang="en-US" dirty="0"/>
-              <a:t>(Build) The bottom implementation is 1.5x slower. Again, these are small numbers here with just 4 student IDs, but if you had hundreds or thousands, you would see a tremendous performance difference.</a:t>
-            </a:r>
-          </a:p>
-          <a:p>
-            <a:pPr marL="0" marR="0" lvl="0" indent="0" defTabSz="228600" eaLnBrk="1" fontAlgn="auto" latinLnBrk="0" hangingPunct="1">
-              <a:lnSpc>
-                <a:spcPct val="117999"/>
-              </a:lnSpc>
-              <a:spcBef>
-                <a:spcPts val="0"/>
-              </a:spcBef>
-              <a:spcAft>
-                <a:spcPts val="0"/>
-              </a:spcAft>
-              <a:buClrTx/>
-              <a:buSzTx/>
-              <a:buFontTx/>
-              <a:buNone/>
-              <a:tabLst/>
-              <a:defRPr/>
-            </a:pPr>
-            <a:endParaRPr lang="en-US" dirty="0"/>
-          </a:p>
-          <a:p>
-            <a:pPr marL="0" marR="0" lvl="0" indent="0" defTabSz="228600" eaLnBrk="1" fontAlgn="auto" latinLnBrk="0" hangingPunct="1">
-              <a:lnSpc>
-                <a:spcPct val="117999"/>
-              </a:lnSpc>
-              <a:spcBef>
-                <a:spcPts val="0"/>
-              </a:spcBef>
-              <a:spcAft>
-                <a:spcPts val="0"/>
-              </a:spcAft>
-              <a:buClrTx/>
-              <a:buSzTx/>
-              <a:buFontTx/>
-              <a:buNone/>
-              <a:tabLst/>
-              <a:defRPr/>
-            </a:pPr>
-            <a:r>
-              <a:rPr lang="en-US" dirty="0"/>
-              <a:t>Hence, our reminder and lesson is to leverage concurrency when possible. If you have multiple things that could happen at once, await them all by using </a:t>
-            </a:r>
-            <a:r>
-              <a:rPr lang="en-US" dirty="0" err="1"/>
-              <a:t>Promise.all</a:t>
-            </a:r>
-            <a:r>
-              <a:rPr lang="en-US" dirty="0"/>
-              <a:t>. This pattern of taking an array of stuff and ‘</a:t>
-            </a:r>
-            <a:r>
-              <a:rPr lang="en-US" dirty="0" err="1"/>
-              <a:t>map’ing</a:t>
-            </a:r>
-            <a:r>
-              <a:rPr lang="en-US" dirty="0"/>
-              <a:t> it to promises is extremely common and valuable – you should write this down.</a:t>
-            </a:r>
           </a:p>
         </p:txBody>
       </p:sp>
     </p:spTree>
     <p:extLst>
       <p:ext uri="{BB962C8B-B14F-4D97-AF65-F5344CB8AC3E}">
-        <p14:creationId xmlns:p14="http://schemas.microsoft.com/office/powerpoint/2010/main" val="32895525"/>
+        <p14:creationId xmlns:p14="http://schemas.microsoft.com/office/powerpoint/2010/main" val="1539856872"/>
       </p:ext>
     </p:extLst>
   </p:cSld>
@@ -1740,7 +1616,7 @@
       </p:grpSpPr>
       <p:sp>
         <p:nvSpPr>
-          <p:cNvPr id="641" name="Shape 641"/>
+          <p:cNvPr id="632" name="Shape 632"/>
           <p:cNvSpPr>
             <a:spLocks noGrp="1" noRot="1" noChangeAspect="1"/>
           </p:cNvSpPr>
@@ -1763,7 +1639,7 @@
       </p:sp>
       <p:sp>
         <p:nvSpPr>
-          <p:cNvPr id="642" name="Shape 642"/>
+          <p:cNvPr id="633" name="Shape 633"/>
           <p:cNvSpPr>
             <a:spLocks noGrp="1"/>
           </p:cNvSpPr>
@@ -1782,7 +1658,13 @@
           <a:p>
             <a:r>
               <a:rPr lang="en-US" dirty="0"/>
-              <a:t>For this activity, you will work with an API client that we will provide to interact with our transcript server.</a:t>
+              <a:t>Why is that concurrency important?</a:t>
+            </a:r>
+          </a:p>
+          <a:p>
+            <a:r>
+              <a:rPr lang="en-US" dirty="0"/>
+              <a:t>Here’s another implementation of those same tasks, which is functionally equivalent. But, there is a subtle difference in how they run.</a:t>
             </a:r>
           </a:p>
           <a:p>
@@ -1791,7 +1673,101 @@
           <a:p>
             <a:r>
               <a:rPr lang="en-US" dirty="0"/>
-              <a:t>&lt;read slide&gt;</a:t>
+              <a:t>(Build) In the code that we built up on the past slides, we create an async task for each student to fetch the transcript.</a:t>
+            </a:r>
+          </a:p>
+          <a:p>
+            <a:endParaRPr lang="en-US" dirty="0"/>
+          </a:p>
+          <a:p>
+            <a:r>
+              <a:rPr lang="en-US" dirty="0"/>
+              <a:t>(Build) In the code on the bottom, we have a single handler. It gets the first student’s transcript. THEN it gets the second, THEN the third, etc. This prevents concurrency: can’t fetch multiple things at once. Same story for the rest of the code – checking the size of each JSON file</a:t>
+            </a:r>
+          </a:p>
+          <a:p>
+            <a:endParaRPr lang="en-US" dirty="0"/>
+          </a:p>
+          <a:p>
+            <a:pPr marL="0" marR="0" lvl="0" indent="0" defTabSz="228600" eaLnBrk="1" fontAlgn="auto" latinLnBrk="0" hangingPunct="1">
+              <a:lnSpc>
+                <a:spcPct val="117999"/>
+              </a:lnSpc>
+              <a:spcBef>
+                <a:spcPts val="0"/>
+              </a:spcBef>
+              <a:spcAft>
+                <a:spcPts val="0"/>
+              </a:spcAft>
+              <a:buClrTx/>
+              <a:buSzTx/>
+              <a:buFontTx/>
+              <a:buNone/>
+              <a:tabLst/>
+              <a:defRPr/>
+            </a:pPr>
+            <a:r>
+              <a:rPr lang="en-US" dirty="0"/>
+              <a:t>(Build) The bottom implementation is 1.5x slower. Again, these are small numbers here with just 4 student IDs, but if you had hundreds or thousands, you would see a tremendous performance difference.</a:t>
+            </a:r>
+          </a:p>
+          <a:p>
+            <a:pPr marL="0" marR="0" lvl="0" indent="0" defTabSz="228600" eaLnBrk="1" fontAlgn="auto" latinLnBrk="0" hangingPunct="1">
+              <a:lnSpc>
+                <a:spcPct val="117999"/>
+              </a:lnSpc>
+              <a:spcBef>
+                <a:spcPts val="0"/>
+              </a:spcBef>
+              <a:spcAft>
+                <a:spcPts val="0"/>
+              </a:spcAft>
+              <a:buClrTx/>
+              <a:buSzTx/>
+              <a:buFontTx/>
+              <a:buNone/>
+              <a:tabLst/>
+              <a:defRPr/>
+            </a:pPr>
+            <a:endParaRPr lang="en-US" dirty="0"/>
+          </a:p>
+          <a:p>
+            <a:pPr marL="0" marR="0" lvl="0" indent="0" defTabSz="228600" eaLnBrk="1" fontAlgn="auto" latinLnBrk="0" hangingPunct="1">
+              <a:lnSpc>
+                <a:spcPct val="117999"/>
+              </a:lnSpc>
+              <a:spcBef>
+                <a:spcPts val="0"/>
+              </a:spcBef>
+              <a:spcAft>
+                <a:spcPts val="0"/>
+              </a:spcAft>
+              <a:buClrTx/>
+              <a:buSzTx/>
+              <a:buFontTx/>
+              <a:buNone/>
+              <a:tabLst/>
+              <a:defRPr/>
+            </a:pPr>
+            <a:r>
+              <a:rPr lang="en-US" dirty="0"/>
+              <a:t>Hence, our reminder and lesson is to leverage concurrency when possible. If you have multiple things that could happen at once, await them all by using </a:t>
+            </a:r>
+            <a:r>
+              <a:rPr lang="en-US" dirty="0" err="1"/>
+              <a:t>Promise.all</a:t>
+            </a:r>
+            <a:r>
+              <a:rPr lang="en-US" dirty="0"/>
+              <a:t>. This pattern of taking an array of stuff and ‘</a:t>
+            </a:r>
+            <a:r>
+              <a:rPr lang="en-US" dirty="0" err="1"/>
+              <a:t>map’ing</a:t>
+            </a:r>
+            <a:r>
+              <a:rPr lang="en-US" dirty="0"/>
+              <a:t> it to promises is extremely common and valuable – you should write this down.</a:t>
             </a:r>
           </a:p>
         </p:txBody>
@@ -1799,7 +1775,7 @@
     </p:spTree>
     <p:extLst>
       <p:ext uri="{BB962C8B-B14F-4D97-AF65-F5344CB8AC3E}">
-        <p14:creationId xmlns:p14="http://schemas.microsoft.com/office/powerpoint/2010/main" val="1192684295"/>
+        <p14:creationId xmlns:p14="http://schemas.microsoft.com/office/powerpoint/2010/main" val="32895525"/>
       </p:ext>
     </p:extLst>
   </p:cSld>
@@ -1828,7 +1804,7 @@
       </p:grpSpPr>
       <p:sp>
         <p:nvSpPr>
-          <p:cNvPr id="2" name="Slide Image Placeholder 1"/>
+          <p:cNvPr id="641" name="Shape 641"/>
           <p:cNvSpPr>
             <a:spLocks noGrp="1" noRot="1" noChangeAspect="1"/>
           </p:cNvSpPr>
@@ -1836,57 +1812,58 @@
             <p:ph type="sldImg"/>
           </p:nvPr>
         </p:nvSpPr>
-        <p:spPr/>
+        <p:spPr>
+          <a:prstGeom prst="rect">
+            <a:avLst/>
+          </a:prstGeom>
+        </p:spPr>
+        <p:txBody>
+          <a:bodyPr/>
+          <a:lstStyle/>
+          <a:p>
+            <a:endParaRPr/>
+          </a:p>
+        </p:txBody>
       </p:sp>
       <p:sp>
         <p:nvSpPr>
-          <p:cNvPr id="3" name="Notes Placeholder 2"/>
+          <p:cNvPr id="642" name="Shape 642"/>
           <p:cNvSpPr>
             <a:spLocks noGrp="1"/>
           </p:cNvSpPr>
           <p:nvPr>
-            <p:ph type="body" idx="1"/>
+            <p:ph type="body" sz="quarter" idx="1"/>
           </p:nvPr>
         </p:nvSpPr>
-        <p:spPr/>
+        <p:spPr>
+          <a:prstGeom prst="rect">
+            <a:avLst/>
+          </a:prstGeom>
+        </p:spPr>
         <p:txBody>
           <a:bodyPr/>
           <a:lstStyle/>
           <a:p>
             <a:r>
               <a:rPr lang="en-US" dirty="0"/>
+              <a:t>For this activity, you will work with an API client that we will provide to interact with our transcript server.</a:t>
+            </a:r>
+          </a:p>
+          <a:p>
+            <a:endParaRPr lang="en-US" dirty="0"/>
+          </a:p>
+          <a:p>
+            <a:r>
+              <a:rPr lang="en-US" dirty="0"/>
               <a:t>&lt;read slide&gt;</a:t>
             </a:r>
-          </a:p>
-        </p:txBody>
-      </p:sp>
-      <p:sp>
-        <p:nvSpPr>
-          <p:cNvPr id="4" name="Slide Number Placeholder 3"/>
-          <p:cNvSpPr>
-            <a:spLocks noGrp="1"/>
-          </p:cNvSpPr>
-          <p:nvPr>
-            <p:ph type="sldNum" sz="quarter" idx="5"/>
-          </p:nvPr>
-        </p:nvSpPr>
-        <p:spPr/>
-        <p:txBody>
-          <a:bodyPr/>
-          <a:lstStyle/>
-          <a:p>
-            <a:fld id="{07937F07-1250-4CCE-B198-1B2887014F41}" type="slidenum">
-              <a:rPr lang="en-US" smtClean="0"/>
-              <a:t>26</a:t>
-            </a:fld>
-            <a:endParaRPr lang="en-US"/>
           </a:p>
         </p:txBody>
       </p:sp>
     </p:spTree>
     <p:extLst>
       <p:ext uri="{BB962C8B-B14F-4D97-AF65-F5344CB8AC3E}">
-        <p14:creationId xmlns:p14="http://schemas.microsoft.com/office/powerpoint/2010/main" val="391175510"/>
+        <p14:creationId xmlns:p14="http://schemas.microsoft.com/office/powerpoint/2010/main" val="1192684295"/>
       </p:ext>
     </p:extLst>
   </p:cSld>
@@ -1964,7 +1941,7 @@
           <a:p>
             <a:fld id="{07937F07-1250-4CCE-B198-1B2887014F41}" type="slidenum">
               <a:rPr lang="en-US" smtClean="0"/>
-              <a:t>27</a:t>
+              <a:t>26</a:t>
             </a:fld>
             <a:endParaRPr lang="en-US"/>
           </a:p>
@@ -1973,7 +1950,7 @@
     </p:spTree>
     <p:extLst>
       <p:ext uri="{BB962C8B-B14F-4D97-AF65-F5344CB8AC3E}">
-        <p14:creationId xmlns:p14="http://schemas.microsoft.com/office/powerpoint/2010/main" val="1416934236"/>
+        <p14:creationId xmlns:p14="http://schemas.microsoft.com/office/powerpoint/2010/main" val="391175510"/>
       </p:ext>
     </p:extLst>
   </p:cSld>
@@ -2029,15 +2006,38 @@
           <a:p>
             <a:r>
               <a:rPr lang="en-US" dirty="0"/>
-              <a:t>(Read slide, these points summarize past few slides, adding the note that if you have concurrency, you have concurrency)</a:t>
-            </a:r>
+              <a:t>&lt;read slide&gt;</a:t>
+            </a:r>
+          </a:p>
+        </p:txBody>
+      </p:sp>
+      <p:sp>
+        <p:nvSpPr>
+          <p:cNvPr id="4" name="Slide Number Placeholder 3"/>
+          <p:cNvSpPr>
+            <a:spLocks noGrp="1"/>
+          </p:cNvSpPr>
+          <p:nvPr>
+            <p:ph type="sldNum" sz="quarter" idx="5"/>
+          </p:nvPr>
+        </p:nvSpPr>
+        <p:spPr/>
+        <p:txBody>
+          <a:bodyPr/>
+          <a:lstStyle/>
+          <a:p>
+            <a:fld id="{07937F07-1250-4CCE-B198-1B2887014F41}" type="slidenum">
+              <a:rPr lang="en-US" smtClean="0"/>
+              <a:t>27</a:t>
+            </a:fld>
+            <a:endParaRPr lang="en-US"/>
           </a:p>
         </p:txBody>
       </p:sp>
     </p:spTree>
     <p:extLst>
       <p:ext uri="{BB962C8B-B14F-4D97-AF65-F5344CB8AC3E}">
-        <p14:creationId xmlns:p14="http://schemas.microsoft.com/office/powerpoint/2010/main" val="358283542"/>
+        <p14:creationId xmlns:p14="http://schemas.microsoft.com/office/powerpoint/2010/main" val="1416934236"/>
       </p:ext>
     </p:extLst>
   </p:cSld>
@@ -2093,32 +2093,7 @@
           <a:p>
             <a:r>
               <a:rPr lang="en-US" dirty="0"/>
-              <a:t>Promises enforce the order of operations only through the .then. The code in the ‘then’ won’t run until the promise is resolved.</a:t>
-            </a:r>
-          </a:p>
-          <a:p>
-            <a:br>
-              <a:rPr lang="en-US" dirty="0"/>
-            </a:br>
-            <a:r>
-              <a:rPr lang="en-US" dirty="0"/>
-              <a:t>(build through example, explaining the possible orders of results. Point out that we should never depend on the order of results we hear back form google/</a:t>
-            </a:r>
-            <a:r>
-              <a:rPr lang="en-US" dirty="0" err="1"/>
-              <a:t>facebook</a:t>
-            </a:r>
-            <a:r>
-              <a:rPr lang="en-US" dirty="0"/>
-              <a:t>/</a:t>
-            </a:r>
-            <a:r>
-              <a:rPr lang="en-US" dirty="0" err="1"/>
-              <a:t>coveytown</a:t>
-            </a:r>
-            <a:r>
-              <a:rPr lang="en-US" dirty="0"/>
-              <a:t> because it is non-deterministic. You might happen to see 9/10 times one ordering, but there is no guarantee)</a:t>
+              <a:t>(Read slide, these points summarize past few slides, adding the note that if you have concurrency, you have concurrency)</a:t>
             </a:r>
           </a:p>
         </p:txBody>
@@ -2126,7 +2101,7 @@
     </p:spTree>
     <p:extLst>
       <p:ext uri="{BB962C8B-B14F-4D97-AF65-F5344CB8AC3E}">
-        <p14:creationId xmlns:p14="http://schemas.microsoft.com/office/powerpoint/2010/main" val="2370993432"/>
+        <p14:creationId xmlns:p14="http://schemas.microsoft.com/office/powerpoint/2010/main" val="358283542"/>
       </p:ext>
     </p:extLst>
   </p:cSld>
@@ -2182,7 +2157,32 @@
           <a:p>
             <a:r>
               <a:rPr lang="en-US" dirty="0"/>
-              <a:t>Promises </a:t>
+              <a:t>Promises enforce the order of operations only through the .then. The code in the ‘then’ won’t run until the promise is resolved.</a:t>
+            </a:r>
+          </a:p>
+          <a:p>
+            <a:br>
+              <a:rPr lang="en-US" dirty="0"/>
+            </a:br>
+            <a:r>
+              <a:rPr lang="en-US" dirty="0"/>
+              <a:t>(build through example, explaining the possible orders of results. Point out that we should never depend on the order of results we hear back form google/</a:t>
+            </a:r>
+            <a:r>
+              <a:rPr lang="en-US" dirty="0" err="1"/>
+              <a:t>facebook</a:t>
+            </a:r>
+            <a:r>
+              <a:rPr lang="en-US" dirty="0"/>
+              <a:t>/</a:t>
+            </a:r>
+            <a:r>
+              <a:rPr lang="en-US" dirty="0" err="1"/>
+              <a:t>coveytown</a:t>
+            </a:r>
+            <a:r>
+              <a:rPr lang="en-US" dirty="0"/>
+              <a:t> because it is non-deterministic. You might happen to see 9/10 times one ordering, but there is no guarantee)</a:t>
             </a:r>
           </a:p>
         </p:txBody>
@@ -2190,7 +2190,7 @@
     </p:spTree>
     <p:extLst>
       <p:ext uri="{BB962C8B-B14F-4D97-AF65-F5344CB8AC3E}">
-        <p14:creationId xmlns:p14="http://schemas.microsoft.com/office/powerpoint/2010/main" val="2379886627"/>
+        <p14:creationId xmlns:p14="http://schemas.microsoft.com/office/powerpoint/2010/main" val="2370993432"/>
       </p:ext>
     </p:extLst>
   </p:cSld>
@@ -2246,37 +2246,7 @@
           <a:p>
             <a:r>
               <a:rPr lang="en-US" dirty="0"/>
-              <a:t>Here is a one-slide comparison of async/await and promises. You should be familiar with the “rules of the road” for async/await.</a:t>
-            </a:r>
-          </a:p>
-          <a:p>
-            <a:r>
-              <a:rPr lang="en-US" dirty="0"/>
-              <a:t>(read slide)</a:t>
-            </a:r>
-          </a:p>
-          <a:p>
-            <a:endParaRPr lang="en-US" dirty="0"/>
-          </a:p>
-          <a:p>
-            <a:r>
-              <a:rPr lang="en-US" dirty="0"/>
-              <a:t>We haven’t talked about error handling yet, but that doesn’t mean you should ignore them! Here’s the two ways to handle errors, one for await, one for using promises.</a:t>
-            </a:r>
-          </a:p>
-          <a:p>
-            <a:r>
-              <a:rPr lang="en-US" dirty="0"/>
-              <a:t>Common gotcha is that try/catch around a promise won’t catch async errors thrown by promise!</a:t>
-            </a:r>
-          </a:p>
-          <a:p>
-            <a:endParaRPr lang="en-US" dirty="0"/>
-          </a:p>
-          <a:p>
-            <a:r>
-              <a:rPr lang="en-US" dirty="0"/>
-              <a:t>Feel free to point out that, again, code on left and code on right are functionally equivalent, and the JS engine will generate code on right from code on left</a:t>
+              <a:t>Promises </a:t>
             </a:r>
           </a:p>
         </p:txBody>
@@ -2284,7 +2254,7 @@
     </p:spTree>
     <p:extLst>
       <p:ext uri="{BB962C8B-B14F-4D97-AF65-F5344CB8AC3E}">
-        <p14:creationId xmlns:p14="http://schemas.microsoft.com/office/powerpoint/2010/main" val="1067216613"/>
+        <p14:creationId xmlns:p14="http://schemas.microsoft.com/office/powerpoint/2010/main" val="2379886627"/>
       </p:ext>
     </p:extLst>
   </p:cSld>
@@ -2340,7 +2310,37 @@
           <a:p>
             <a:r>
               <a:rPr lang="en-US" dirty="0"/>
-              <a:t>In JS, only one computation (other than asynchronous IO) is running at a time, so statement 3 is guaranteed to run *immediately* after statement 2.</a:t>
+              <a:t>Here is a one-slide comparison of async/await and promises. You should be familiar with the “rules of the road” for async/await.</a:t>
+            </a:r>
+          </a:p>
+          <a:p>
+            <a:r>
+              <a:rPr lang="en-US" dirty="0"/>
+              <a:t>(read slide)</a:t>
+            </a:r>
+          </a:p>
+          <a:p>
+            <a:endParaRPr lang="en-US" dirty="0"/>
+          </a:p>
+          <a:p>
+            <a:r>
+              <a:rPr lang="en-US" dirty="0"/>
+              <a:t>We haven’t talked about error handling yet, but that doesn’t mean you should ignore them! Here’s the two ways to handle errors, one for await, one for using promises.</a:t>
+            </a:r>
+          </a:p>
+          <a:p>
+            <a:r>
+              <a:rPr lang="en-US" dirty="0"/>
+              <a:t>Common gotcha is that try/catch around a promise won’t catch async errors thrown by promise!</a:t>
+            </a:r>
+          </a:p>
+          <a:p>
+            <a:endParaRPr lang="en-US" dirty="0"/>
+          </a:p>
+          <a:p>
+            <a:r>
+              <a:rPr lang="en-US" dirty="0"/>
+              <a:t>Feel free to point out that, again, code on left and code on right are functionally equivalent, and the JS engine will generate code on right from code on left</a:t>
             </a:r>
           </a:p>
         </p:txBody>
@@ -2348,7 +2348,7 @@
     </p:spTree>
     <p:extLst>
       <p:ext uri="{BB962C8B-B14F-4D97-AF65-F5344CB8AC3E}">
-        <p14:creationId xmlns:p14="http://schemas.microsoft.com/office/powerpoint/2010/main" val="4154279858"/>
+        <p14:creationId xmlns:p14="http://schemas.microsoft.com/office/powerpoint/2010/main" val="1067216613"/>
       </p:ext>
     </p:extLst>
   </p:cSld>
@@ -2404,43 +2404,15 @@
           <a:p>
             <a:r>
               <a:rPr lang="en-US" dirty="0"/>
-              <a:t>We said at the end of the last lecture that making a clock that ticks by itself was easy and that we would learn about it in the next lecture.  Well, here it is.</a:t>
-            </a:r>
-          </a:p>
-          <a:p>
-            <a:r>
-              <a:rPr lang="en-US" b="1" dirty="0" err="1"/>
-              <a:t>setInterval</a:t>
-            </a:r>
-            <a:r>
-              <a:rPr lang="en-US" b="1" dirty="0"/>
-              <a:t> </a:t>
-            </a:r>
-            <a:r>
-              <a:rPr lang="en-US" b="0" dirty="0"/>
-              <a:t>is one of the JS primitives that creates a concurrent computation.  Here, it creates a concurrent computation that ticks the clock every 50 </a:t>
-            </a:r>
-            <a:r>
-              <a:rPr lang="en-US" b="0" dirty="0" err="1"/>
-              <a:t>ms.</a:t>
-            </a:r>
-            <a:endParaRPr lang="en-US" b="0" dirty="0"/>
-          </a:p>
-          <a:p>
-            <a:r>
-              <a:rPr lang="en-US" b="0" dirty="0"/>
-              <a:t>We told you it was easy!</a:t>
-            </a:r>
-          </a:p>
-          <a:p>
-            <a:endParaRPr lang="en-US" b="1" dirty="0"/>
+              <a:t>In JS, only one computation (other than asynchronous IO) is running at a time, so statement 3 is guaranteed to run *immediately* after statement 2.</a:t>
+            </a:r>
           </a:p>
         </p:txBody>
       </p:sp>
     </p:spTree>
     <p:extLst>
       <p:ext uri="{BB962C8B-B14F-4D97-AF65-F5344CB8AC3E}">
-        <p14:creationId xmlns:p14="http://schemas.microsoft.com/office/powerpoint/2010/main" val="752047573"/>
+        <p14:creationId xmlns:p14="http://schemas.microsoft.com/office/powerpoint/2010/main" val="4154279858"/>
       </p:ext>
     </p:extLst>
   </p:cSld>
@@ -2496,38 +2468,43 @@
           <a:p>
             <a:r>
               <a:rPr lang="en-US" dirty="0"/>
-              <a:t>&lt;read slide&gt;</a:t>
-            </a:r>
-          </a:p>
-        </p:txBody>
-      </p:sp>
-      <p:sp>
-        <p:nvSpPr>
-          <p:cNvPr id="4" name="Slide Number Placeholder 3"/>
-          <p:cNvSpPr>
-            <a:spLocks noGrp="1"/>
-          </p:cNvSpPr>
-          <p:nvPr>
-            <p:ph type="sldNum" sz="quarter" idx="5"/>
-          </p:nvPr>
-        </p:nvSpPr>
-        <p:spPr/>
-        <p:txBody>
-          <a:bodyPr/>
-          <a:lstStyle/>
-          <a:p>
-            <a:fld id="{07937F07-1250-4CCE-B198-1B2887014F41}" type="slidenum">
-              <a:rPr lang="en-US" smtClean="0"/>
-              <a:t>39</a:t>
-            </a:fld>
-            <a:endParaRPr lang="en-US"/>
+              <a:t>We said at the end of the last lecture that making a clock that ticks by itself was easy and that we would learn about it in the next lecture.  Well, here it is.</a:t>
+            </a:r>
+          </a:p>
+          <a:p>
+            <a:r>
+              <a:rPr lang="en-US" b="1" dirty="0" err="1"/>
+              <a:t>setInterval</a:t>
+            </a:r>
+            <a:r>
+              <a:rPr lang="en-US" b="1" dirty="0"/>
+              <a:t> </a:t>
+            </a:r>
+            <a:r>
+              <a:rPr lang="en-US" b="0" dirty="0"/>
+              <a:t>is one of the JS primitives that creates a concurrent computation.  Here, it creates a concurrent computation that ticks the clock every 50 </a:t>
+            </a:r>
+            <a:r>
+              <a:rPr lang="en-US" b="0" dirty="0" err="1"/>
+              <a:t>ms.</a:t>
+            </a:r>
+            <a:endParaRPr lang="en-US" b="0" dirty="0"/>
+          </a:p>
+          <a:p>
+            <a:r>
+              <a:rPr lang="en-US" b="0" dirty="0"/>
+              <a:t>We told you it was easy!</a:t>
+            </a:r>
+          </a:p>
+          <a:p>
+            <a:endParaRPr lang="en-US" b="1" dirty="0"/>
           </a:p>
         </p:txBody>
       </p:sp>
     </p:spTree>
     <p:extLst>
       <p:ext uri="{BB962C8B-B14F-4D97-AF65-F5344CB8AC3E}">
-        <p14:creationId xmlns:p14="http://schemas.microsoft.com/office/powerpoint/2010/main" val="2031181207"/>
+        <p14:creationId xmlns:p14="http://schemas.microsoft.com/office/powerpoint/2010/main" val="752047573"/>
       </p:ext>
     </p:extLst>
   </p:cSld>
@@ -2628,6 +2605,93 @@
     <p:extLst>
       <p:ext uri="{BB962C8B-B14F-4D97-AF65-F5344CB8AC3E}">
         <p14:creationId xmlns:p14="http://schemas.microsoft.com/office/powerpoint/2010/main" val="4289812031"/>
+      </p:ext>
+    </p:extLst>
+  </p:cSld>
+  <p:clrMapOvr>
+    <a:masterClrMapping/>
+  </p:clrMapOvr>
+</p:notes>
+</file>
+
+<file path=ppt/notesSlides/notesSlide30.xml><?xml version="1.0" encoding="utf-8"?>
+<p:notes xmlns:a="http://schemas.openxmlformats.org/drawingml/2006/main" xmlns:r="http://schemas.openxmlformats.org/officeDocument/2006/relationships" xmlns:p="http://schemas.openxmlformats.org/presentationml/2006/main">
+  <p:cSld>
+    <p:spTree>
+      <p:nvGrpSpPr>
+        <p:cNvPr id="1" name=""/>
+        <p:cNvGrpSpPr/>
+        <p:nvPr/>
+      </p:nvGrpSpPr>
+      <p:grpSpPr>
+        <a:xfrm>
+          <a:off x="0" y="0"/>
+          <a:ext cx="0" cy="0"/>
+          <a:chOff x="0" y="0"/>
+          <a:chExt cx="0" cy="0"/>
+        </a:xfrm>
+      </p:grpSpPr>
+      <p:sp>
+        <p:nvSpPr>
+          <p:cNvPr id="2" name="Slide Image Placeholder 1"/>
+          <p:cNvSpPr>
+            <a:spLocks noGrp="1" noRot="1" noChangeAspect="1"/>
+          </p:cNvSpPr>
+          <p:nvPr>
+            <p:ph type="sldImg"/>
+          </p:nvPr>
+        </p:nvSpPr>
+        <p:spPr/>
+      </p:sp>
+      <p:sp>
+        <p:nvSpPr>
+          <p:cNvPr id="3" name="Notes Placeholder 2"/>
+          <p:cNvSpPr>
+            <a:spLocks noGrp="1"/>
+          </p:cNvSpPr>
+          <p:nvPr>
+            <p:ph type="body" idx="1"/>
+          </p:nvPr>
+        </p:nvSpPr>
+        <p:spPr/>
+        <p:txBody>
+          <a:bodyPr/>
+          <a:lstStyle/>
+          <a:p>
+            <a:r>
+              <a:rPr lang="en-US" dirty="0"/>
+              <a:t>&lt;read slide&gt;</a:t>
+            </a:r>
+          </a:p>
+        </p:txBody>
+      </p:sp>
+      <p:sp>
+        <p:nvSpPr>
+          <p:cNvPr id="4" name="Slide Number Placeholder 3"/>
+          <p:cNvSpPr>
+            <a:spLocks noGrp="1"/>
+          </p:cNvSpPr>
+          <p:nvPr>
+            <p:ph type="sldNum" sz="quarter" idx="5"/>
+          </p:nvPr>
+        </p:nvSpPr>
+        <p:spPr/>
+        <p:txBody>
+          <a:bodyPr/>
+          <a:lstStyle/>
+          <a:p>
+            <a:fld id="{07937F07-1250-4CCE-B198-1B2887014F41}" type="slidenum">
+              <a:rPr lang="en-US" smtClean="0"/>
+              <a:t>39</a:t>
+            </a:fld>
+            <a:endParaRPr lang="en-US"/>
+          </a:p>
+        </p:txBody>
+      </p:sp>
+    </p:spTree>
+    <p:extLst>
+      <p:ext uri="{BB962C8B-B14F-4D97-AF65-F5344CB8AC3E}">
+        <p14:creationId xmlns:p14="http://schemas.microsoft.com/office/powerpoint/2010/main" val="2031181207"/>
       </p:ext>
     </p:extLst>
   </p:cSld>
@@ -2898,39 +2962,23 @@
           <a:p>
             <a:r>
               <a:rPr lang="en-US" dirty="0"/>
-              <a:t>Note:</a:t>
-            </a:r>
-          </a:p>
-          <a:p>
+              <a:t>Your function is currently suspended and is awaiting the </a:t>
+            </a:r>
+            <a:r>
+              <a:rPr lang="en-US" dirty="0" err="1"/>
+              <a:t>axios.get</a:t>
+            </a:r>
             <a:r>
               <a:rPr lang="en-US" dirty="0"/>
-              <a:t>When one request starts, this code proceeds to the next one.</a:t>
-            </a:r>
-          </a:p>
-          <a:p>
-            <a:r>
-              <a:rPr lang="en-US" dirty="0"/>
-              <a:t>The starting process ran to completion: the Console.log executed before the requests.</a:t>
-            </a:r>
-          </a:p>
-          <a:p>
-            <a:endParaRPr lang="en-US" dirty="0"/>
-          </a:p>
-          <a:p>
-            <a:r>
-              <a:rPr lang="en-US" dirty="0"/>
-              <a:t>Transmission is out-of-order:  Request 2 evidently reached the server before Request 1.</a:t>
-            </a:r>
-          </a:p>
-          <a:p>
-            <a:endParaRPr lang="en-US" dirty="0"/>
+              <a:t> to be returned. Since get is itself async function, it returns the promise immediately which allows you to continue executing the suspended function.</a:t>
+            </a:r>
           </a:p>
         </p:txBody>
       </p:sp>
     </p:spTree>
     <p:extLst>
       <p:ext uri="{BB962C8B-B14F-4D97-AF65-F5344CB8AC3E}">
-        <p14:creationId xmlns:p14="http://schemas.microsoft.com/office/powerpoint/2010/main" val="2432822581"/>
+        <p14:creationId xmlns:p14="http://schemas.microsoft.com/office/powerpoint/2010/main" val="1001250134"/>
       </p:ext>
     </p:extLst>
   </p:cSld>
@@ -2986,15 +3034,39 @@
           <a:p>
             <a:r>
               <a:rPr lang="en-US" dirty="0"/>
-              <a:t>Here, the caller waits for each request to finish before starting the next one.</a:t>
-            </a:r>
+              <a:t>Note:</a:t>
+            </a:r>
+          </a:p>
+          <a:p>
+            <a:r>
+              <a:rPr lang="en-US" dirty="0"/>
+              <a:t>When one request starts, this code proceeds to the next one.</a:t>
+            </a:r>
+          </a:p>
+          <a:p>
+            <a:r>
+              <a:rPr lang="en-US" dirty="0"/>
+              <a:t>The starting process ran to completion: the Console.log executed before the requests.</a:t>
+            </a:r>
+          </a:p>
+          <a:p>
+            <a:endParaRPr lang="en-US" dirty="0"/>
+          </a:p>
+          <a:p>
+            <a:r>
+              <a:rPr lang="en-US" dirty="0"/>
+              <a:t>Transmission is out-of-order:  Request 2 evidently reached the server before Request 1.</a:t>
+            </a:r>
+          </a:p>
+          <a:p>
+            <a:endParaRPr lang="en-US" dirty="0"/>
           </a:p>
         </p:txBody>
       </p:sp>
     </p:spTree>
     <p:extLst>
       <p:ext uri="{BB962C8B-B14F-4D97-AF65-F5344CB8AC3E}">
-        <p14:creationId xmlns:p14="http://schemas.microsoft.com/office/powerpoint/2010/main" val="2293380916"/>
+        <p14:creationId xmlns:p14="http://schemas.microsoft.com/office/powerpoint/2010/main" val="2432822581"/>
       </p:ext>
     </p:extLst>
   </p:cSld>
@@ -3050,7 +3122,7 @@
           <a:p>
             <a:r>
               <a:rPr lang="en-US" dirty="0"/>
-              <a:t>Here all three requests are sent out concurrently.  </a:t>
+              <a:t>Here, the caller waits for each request to finish before starting the next one.</a:t>
             </a:r>
           </a:p>
         </p:txBody>
@@ -3058,7 +3130,7 @@
     </p:spTree>
     <p:extLst>
       <p:ext uri="{BB962C8B-B14F-4D97-AF65-F5344CB8AC3E}">
-        <p14:creationId xmlns:p14="http://schemas.microsoft.com/office/powerpoint/2010/main" val="3329866587"/>
+        <p14:creationId xmlns:p14="http://schemas.microsoft.com/office/powerpoint/2010/main" val="2293380916"/>
       </p:ext>
     </p:extLst>
   </p:cSld>
@@ -3271,7 +3343,7 @@
                 <a:tabLst/>
                 <a:defRPr/>
               </a:pPr>
-              <a:t>9/12/2023</a:t>
+              <a:t>9/19/2023</a:t>
             </a:fld>
             <a:endParaRPr kumimoji="0" lang="en-US" sz="1200" b="0" i="0" u="none" strike="noStrike" kern="1200" cap="none" spc="0" normalizeH="0" baseline="0" noProof="0">
               <a:ln>
@@ -3755,7 +3827,7 @@
                 <a:tabLst/>
                 <a:defRPr/>
               </a:pPr>
-              <a:t>9/12/2023</a:t>
+              <a:t>9/19/2023</a:t>
             </a:fld>
             <a:endParaRPr kumimoji="0" lang="en-US" sz="1200" b="0" i="0" u="none" strike="noStrike" kern="1200" cap="none" spc="0" normalizeH="0" baseline="0" noProof="0">
               <a:ln>
@@ -4113,7 +4185,7 @@
                 <a:tabLst/>
                 <a:defRPr/>
               </a:pPr>
-              <a:t>9/12/2023</a:t>
+              <a:t>9/19/2023</a:t>
             </a:fld>
             <a:endParaRPr kumimoji="0" lang="en-US" sz="1200" b="0" i="0" u="none" strike="noStrike" kern="1200" cap="none" spc="0" normalizeH="0" baseline="0" noProof="0">
               <a:ln>
@@ -4481,7 +4553,7 @@
                 <a:tabLst/>
                 <a:defRPr/>
               </a:pPr>
-              <a:t>9/12/2023</a:t>
+              <a:t>9/19/2023</a:t>
             </a:fld>
             <a:endParaRPr kumimoji="0" lang="en-US" sz="1200" b="0" i="0" u="none" strike="noStrike" kern="1200" cap="none" spc="0" normalizeH="0" baseline="0" noProof="0">
               <a:ln>
@@ -5447,7 +5519,7 @@
                 <a:tabLst/>
                 <a:defRPr/>
               </a:pPr>
-              <a:t>9/12/2023</a:t>
+              <a:t>9/19/2023</a:t>
             </a:fld>
             <a:endParaRPr kumimoji="0" lang="en-US" sz="1200" b="0" i="0" u="none" strike="noStrike" kern="1200" cap="none" spc="0" normalizeH="0" baseline="0" noProof="0">
               <a:ln>
@@ -5857,7 +5929,7 @@
                 <a:tabLst/>
                 <a:defRPr/>
               </a:pPr>
-              <a:t>9/12/2023</a:t>
+              <a:t>9/19/2023</a:t>
             </a:fld>
             <a:endParaRPr kumimoji="0" lang="en-US" sz="1200" b="0" i="0" u="none" strike="noStrike" kern="1200" cap="none" spc="0" normalizeH="0" baseline="0" noProof="0">
               <a:ln>
@@ -6199,7 +6271,7 @@
                 <a:tabLst/>
                 <a:defRPr/>
               </a:pPr>
-              <a:t>9/12/2023</a:t>
+              <a:t>9/19/2023</a:t>
             </a:fld>
             <a:endParaRPr kumimoji="0" lang="en-US" sz="1200" b="0" i="0" u="none" strike="noStrike" kern="1200" cap="none" spc="0" normalizeH="0" baseline="0" noProof="0">
               <a:ln>
@@ -6672,7 +6744,7 @@
                 <a:tabLst/>
                 <a:defRPr/>
               </a:pPr>
-              <a:t>9/12/2023</a:t>
+              <a:t>9/19/2023</a:t>
             </a:fld>
             <a:endParaRPr kumimoji="0" lang="en-US" sz="1200" b="0" i="0" u="none" strike="noStrike" kern="1200" cap="none" spc="0" normalizeH="0" baseline="0" noProof="0">
               <a:ln>
@@ -7133,7 +7205,7 @@
                 <a:tabLst/>
                 <a:defRPr/>
               </a:pPr>
-              <a:t>9/12/2023</a:t>
+              <a:t>9/19/2023</a:t>
             </a:fld>
             <a:endParaRPr kumimoji="0" lang="en-US" sz="1200" b="0" i="0" u="none" strike="noStrike" kern="1200" cap="none" spc="0" normalizeH="0" baseline="0" noProof="0">
               <a:ln>
@@ -7741,7 +7813,7 @@
                 <a:tabLst/>
                 <a:defRPr/>
               </a:pPr>
-              <a:t>9/12/2023</a:t>
+              <a:t>9/19/2023</a:t>
             </a:fld>
             <a:endParaRPr kumimoji="0" lang="en-US" sz="1200" b="0" i="0" u="none" strike="noStrike" kern="1200" cap="none" spc="0" normalizeH="0" baseline="0" noProof="0">
               <a:ln>
@@ -8014,7 +8086,7 @@
                 <a:tabLst/>
                 <a:defRPr/>
               </a:pPr>
-              <a:t>9/12/2023</a:t>
+              <a:t>9/19/2023</a:t>
             </a:fld>
             <a:endParaRPr kumimoji="0" lang="en-US" sz="1200" b="0" i="0" u="none" strike="noStrike" kern="1200" cap="none" spc="0" normalizeH="0" baseline="0" noProof="0">
               <a:ln>
@@ -8485,7 +8557,7 @@
                 <a:tabLst/>
                 <a:defRPr/>
               </a:pPr>
-              <a:t>9/12/2023</a:t>
+              <a:t>9/19/2023</a:t>
             </a:fld>
             <a:endParaRPr kumimoji="0" lang="en-US" sz="1200" b="0" i="0" u="none" strike="noStrike" kern="1200" cap="none" spc="0" normalizeH="0" baseline="0" noProof="0">
               <a:ln>
@@ -8886,7 +8958,7 @@
                 <a:tabLst/>
                 <a:defRPr/>
               </a:pPr>
-              <a:t>9/12/2023</a:t>
+              <a:t>9/19/2023</a:t>
             </a:fld>
             <a:endParaRPr kumimoji="0" lang="en-US" sz="1200" b="0" i="0" u="none" strike="noStrike" kern="1200" cap="none" spc="0" normalizeH="0" baseline="0" noProof="0">
               <a:ln>
@@ -9682,12 +9754,22 @@
             <p:ph idx="1"/>
           </p:nvPr>
         </p:nvSpPr>
-        <p:spPr/>
+        <p:spPr>
+          <a:xfrm>
+            <a:off x="8310030" y="1479668"/>
+            <a:ext cx="3614748" cy="4351338"/>
+          </a:xfrm>
+        </p:spPr>
         <p:txBody>
-          <a:bodyPr/>
+          <a:bodyPr>
+            <a:normAutofit/>
+          </a:bodyPr>
           <a:lstStyle/>
           <a:p>
-            <a:endParaRPr lang="en-US"/>
+            <a:r>
+              <a:rPr lang="en-US" sz="2400" i="1" dirty="0"/>
+              <a:t>Notice that the empty promise from the first function returned (even though the computation is suspended). This allows the second function to be called.</a:t>
+            </a:r>
           </a:p>
         </p:txBody>
       </p:sp>
@@ -13275,7 +13357,7 @@
           </a:ln>
           <a:extLst>
             <a:ext uri="{C572A759-6A51-4108-AA02-DFA0A04FC94B}">
-              <ma14:wrappingTextBoxFlag xmlns="" xmlns:m="http://schemas.openxmlformats.org/officeDocument/2006/math" xmlns:a14="http://schemas.microsoft.com/office/drawing/2010/main" xmlns:ma14="http://schemas.microsoft.com/office/mac/drawingml/2011/main" val="1"/>
+              <ma14:wrappingTextBoxFlag xmlns:ma14="http://schemas.microsoft.com/office/mac/drawingml/2011/main" xmlns:a14="http://schemas.microsoft.com/office/drawing/2010/main" xmlns:m="http://schemas.openxmlformats.org/officeDocument/2006/math" xmlns="" val="1"/>
             </a:ext>
           </a:extLst>
         </p:spPr>
@@ -13864,7 +13946,7 @@
           </a:ln>
           <a:extLst>
             <a:ext uri="{C572A759-6A51-4108-AA02-DFA0A04FC94B}">
-              <ma14:wrappingTextBoxFlag xmlns="" xmlns:m="http://schemas.openxmlformats.org/officeDocument/2006/math" xmlns:a14="http://schemas.microsoft.com/office/drawing/2010/main" xmlns:ma14="http://schemas.microsoft.com/office/mac/drawingml/2011/main" val="1"/>
+              <ma14:wrappingTextBoxFlag xmlns:ma14="http://schemas.microsoft.com/office/mac/drawingml/2011/main" xmlns:a14="http://schemas.microsoft.com/office/drawing/2010/main" xmlns:m="http://schemas.openxmlformats.org/officeDocument/2006/math" xmlns="" val="1"/>
             </a:ext>
           </a:extLst>
         </p:spPr>
@@ -15065,7 +15147,7 @@
             <a:effectLst/>
             <a:extLst>
               <a:ext uri="{C572A759-6A51-4108-AA02-DFA0A04FC94B}">
-                <ma14:wrappingTextBoxFlag xmlns="" xmlns:m="http://schemas.openxmlformats.org/officeDocument/2006/math" xmlns:a14="http://schemas.microsoft.com/office/drawing/2010/main" xmlns:ma14="http://schemas.microsoft.com/office/mac/drawingml/2011/main" val="1"/>
+                <ma14:wrappingTextBoxFlag xmlns:ma14="http://schemas.microsoft.com/office/mac/drawingml/2011/main" xmlns:a14="http://schemas.microsoft.com/office/drawing/2010/main" xmlns:m="http://schemas.openxmlformats.org/officeDocument/2006/math" xmlns="" val="1"/>
               </a:ext>
             </a:extLst>
           </p:spPr>
@@ -15134,7 +15216,7 @@
             <a:effectLst/>
             <a:extLst>
               <a:ext uri="{C572A759-6A51-4108-AA02-DFA0A04FC94B}">
-                <ma14:wrappingTextBoxFlag xmlns="" xmlns:m="http://schemas.openxmlformats.org/officeDocument/2006/math" xmlns:a14="http://schemas.microsoft.com/office/drawing/2010/main" xmlns:ma14="http://schemas.microsoft.com/office/mac/drawingml/2011/main" val="1"/>
+                <ma14:wrappingTextBoxFlag xmlns:ma14="http://schemas.microsoft.com/office/mac/drawingml/2011/main" xmlns:a14="http://schemas.microsoft.com/office/drawing/2010/main" xmlns:m="http://schemas.openxmlformats.org/officeDocument/2006/math" xmlns="" val="1"/>
               </a:ext>
             </a:extLst>
           </p:spPr>
@@ -15200,7 +15282,7 @@
             </a:ln>
             <a:extLst>
               <a:ext uri="{C572A759-6A51-4108-AA02-DFA0A04FC94B}">
-                <ma14:wrappingTextBoxFlag xmlns="" xmlns:m="http://schemas.openxmlformats.org/officeDocument/2006/math" xmlns:a14="http://schemas.microsoft.com/office/drawing/2010/main" xmlns:ma14="http://schemas.microsoft.com/office/mac/drawingml/2011/main" val="1"/>
+                <ma14:wrappingTextBoxFlag xmlns:ma14="http://schemas.microsoft.com/office/mac/drawingml/2011/main" xmlns:a14="http://schemas.microsoft.com/office/drawing/2010/main" xmlns:m="http://schemas.openxmlformats.org/officeDocument/2006/math" xmlns="" val="1"/>
               </a:ext>
             </a:extLst>
           </p:spPr>
@@ -15258,7 +15340,7 @@
             </a:ln>
             <a:extLst>
               <a:ext uri="{C572A759-6A51-4108-AA02-DFA0A04FC94B}">
-                <ma14:wrappingTextBoxFlag xmlns="" xmlns:m="http://schemas.openxmlformats.org/officeDocument/2006/math" xmlns:a14="http://schemas.microsoft.com/office/drawing/2010/main" xmlns:ma14="http://schemas.microsoft.com/office/mac/drawingml/2011/main" val="1"/>
+                <ma14:wrappingTextBoxFlag xmlns:ma14="http://schemas.microsoft.com/office/mac/drawingml/2011/main" xmlns:a14="http://schemas.microsoft.com/office/drawing/2010/main" xmlns:m="http://schemas.openxmlformats.org/officeDocument/2006/math" xmlns="" val="1"/>
               </a:ext>
             </a:extLst>
           </p:spPr>
@@ -15339,7 +15421,7 @@
             <a:effectLst/>
             <a:extLst>
               <a:ext uri="{C572A759-6A51-4108-AA02-DFA0A04FC94B}">
-                <ma14:wrappingTextBoxFlag xmlns="" xmlns:m="http://schemas.openxmlformats.org/officeDocument/2006/math" xmlns:a14="http://schemas.microsoft.com/office/drawing/2010/main" xmlns:ma14="http://schemas.microsoft.com/office/mac/drawingml/2011/main" val="1"/>
+                <ma14:wrappingTextBoxFlag xmlns:ma14="http://schemas.microsoft.com/office/mac/drawingml/2011/main" xmlns:a14="http://schemas.microsoft.com/office/drawing/2010/main" xmlns:m="http://schemas.openxmlformats.org/officeDocument/2006/math" xmlns="" val="1"/>
               </a:ext>
             </a:extLst>
           </p:spPr>
@@ -15412,7 +15494,7 @@
             <a:effectLst/>
             <a:extLst>
               <a:ext uri="{C572A759-6A51-4108-AA02-DFA0A04FC94B}">
-                <ma14:wrappingTextBoxFlag xmlns="" xmlns:m="http://schemas.openxmlformats.org/officeDocument/2006/math" xmlns:a14="http://schemas.microsoft.com/office/drawing/2010/main" xmlns:ma14="http://schemas.microsoft.com/office/mac/drawingml/2011/main" val="1"/>
+                <ma14:wrappingTextBoxFlag xmlns:ma14="http://schemas.microsoft.com/office/mac/drawingml/2011/main" xmlns:a14="http://schemas.microsoft.com/office/drawing/2010/main" xmlns:m="http://schemas.openxmlformats.org/officeDocument/2006/math" xmlns="" val="1"/>
               </a:ext>
             </a:extLst>
           </p:spPr>
@@ -15478,7 +15560,7 @@
             </a:ln>
             <a:extLst>
               <a:ext uri="{C572A759-6A51-4108-AA02-DFA0A04FC94B}">
-                <ma14:wrappingTextBoxFlag xmlns="" xmlns:m="http://schemas.openxmlformats.org/officeDocument/2006/math" xmlns:a14="http://schemas.microsoft.com/office/drawing/2010/main" xmlns:ma14="http://schemas.microsoft.com/office/mac/drawingml/2011/main" val="1"/>
+                <ma14:wrappingTextBoxFlag xmlns:ma14="http://schemas.microsoft.com/office/mac/drawingml/2011/main" xmlns:a14="http://schemas.microsoft.com/office/drawing/2010/main" xmlns:m="http://schemas.openxmlformats.org/officeDocument/2006/math" xmlns="" val="1"/>
               </a:ext>
             </a:extLst>
           </p:spPr>
@@ -15536,7 +15618,7 @@
             </a:ln>
             <a:extLst>
               <a:ext uri="{C572A759-6A51-4108-AA02-DFA0A04FC94B}">
-                <ma14:wrappingTextBoxFlag xmlns="" xmlns:m="http://schemas.openxmlformats.org/officeDocument/2006/math" xmlns:a14="http://schemas.microsoft.com/office/drawing/2010/main" xmlns:ma14="http://schemas.microsoft.com/office/mac/drawingml/2011/main" val="1"/>
+                <ma14:wrappingTextBoxFlag xmlns:ma14="http://schemas.microsoft.com/office/mac/drawingml/2011/main" xmlns:a14="http://schemas.microsoft.com/office/drawing/2010/main" xmlns:m="http://schemas.openxmlformats.org/officeDocument/2006/math" xmlns="" val="1"/>
               </a:ext>
             </a:extLst>
           </p:spPr>
@@ -15617,7 +15699,7 @@
             <a:effectLst/>
             <a:extLst>
               <a:ext uri="{C572A759-6A51-4108-AA02-DFA0A04FC94B}">
-                <ma14:wrappingTextBoxFlag xmlns="" xmlns:m="http://schemas.openxmlformats.org/officeDocument/2006/math" xmlns:a14="http://schemas.microsoft.com/office/drawing/2010/main" xmlns:ma14="http://schemas.microsoft.com/office/mac/drawingml/2011/main" val="1"/>
+                <ma14:wrappingTextBoxFlag xmlns:ma14="http://schemas.microsoft.com/office/mac/drawingml/2011/main" xmlns:a14="http://schemas.microsoft.com/office/drawing/2010/main" xmlns:m="http://schemas.openxmlformats.org/officeDocument/2006/math" xmlns="" val="1"/>
               </a:ext>
             </a:extLst>
           </p:spPr>
@@ -15690,7 +15772,7 @@
             <a:effectLst/>
             <a:extLst>
               <a:ext uri="{C572A759-6A51-4108-AA02-DFA0A04FC94B}">
-                <ma14:wrappingTextBoxFlag xmlns="" xmlns:m="http://schemas.openxmlformats.org/officeDocument/2006/math" xmlns:a14="http://schemas.microsoft.com/office/drawing/2010/main" xmlns:ma14="http://schemas.microsoft.com/office/mac/drawingml/2011/main" val="1"/>
+                <ma14:wrappingTextBoxFlag xmlns:ma14="http://schemas.microsoft.com/office/mac/drawingml/2011/main" xmlns:a14="http://schemas.microsoft.com/office/drawing/2010/main" xmlns:m="http://schemas.openxmlformats.org/officeDocument/2006/math" xmlns="" val="1"/>
               </a:ext>
             </a:extLst>
           </p:spPr>
@@ -15756,7 +15838,7 @@
             </a:ln>
             <a:extLst>
               <a:ext uri="{C572A759-6A51-4108-AA02-DFA0A04FC94B}">
-                <ma14:wrappingTextBoxFlag xmlns="" xmlns:m="http://schemas.openxmlformats.org/officeDocument/2006/math" xmlns:a14="http://schemas.microsoft.com/office/drawing/2010/main" xmlns:ma14="http://schemas.microsoft.com/office/mac/drawingml/2011/main" val="1"/>
+                <ma14:wrappingTextBoxFlag xmlns:ma14="http://schemas.microsoft.com/office/mac/drawingml/2011/main" xmlns:a14="http://schemas.microsoft.com/office/drawing/2010/main" xmlns:m="http://schemas.openxmlformats.org/officeDocument/2006/math" xmlns="" val="1"/>
               </a:ext>
             </a:extLst>
           </p:spPr>
@@ -15814,7 +15896,7 @@
             </a:ln>
             <a:extLst>
               <a:ext uri="{C572A759-6A51-4108-AA02-DFA0A04FC94B}">
-                <ma14:wrappingTextBoxFlag xmlns="" xmlns:m="http://schemas.openxmlformats.org/officeDocument/2006/math" xmlns:a14="http://schemas.microsoft.com/office/drawing/2010/main" xmlns:ma14="http://schemas.microsoft.com/office/mac/drawingml/2011/main" val="1"/>
+                <ma14:wrappingTextBoxFlag xmlns:ma14="http://schemas.microsoft.com/office/mac/drawingml/2011/main" xmlns:a14="http://schemas.microsoft.com/office/drawing/2010/main" xmlns:m="http://schemas.openxmlformats.org/officeDocument/2006/math" xmlns="" val="1"/>
               </a:ext>
             </a:extLst>
           </p:spPr>
@@ -15895,7 +15977,7 @@
             <a:effectLst/>
             <a:extLst>
               <a:ext uri="{C572A759-6A51-4108-AA02-DFA0A04FC94B}">
-                <ma14:wrappingTextBoxFlag xmlns="" xmlns:m="http://schemas.openxmlformats.org/officeDocument/2006/math" xmlns:a14="http://schemas.microsoft.com/office/drawing/2010/main" xmlns:ma14="http://schemas.microsoft.com/office/mac/drawingml/2011/main" val="1"/>
+                <ma14:wrappingTextBoxFlag xmlns:ma14="http://schemas.microsoft.com/office/mac/drawingml/2011/main" xmlns:a14="http://schemas.microsoft.com/office/drawing/2010/main" xmlns:m="http://schemas.openxmlformats.org/officeDocument/2006/math" xmlns="" val="1"/>
               </a:ext>
             </a:extLst>
           </p:spPr>
@@ -15964,7 +16046,7 @@
             <a:effectLst/>
             <a:extLst>
               <a:ext uri="{C572A759-6A51-4108-AA02-DFA0A04FC94B}">
-                <ma14:wrappingTextBoxFlag xmlns="" xmlns:m="http://schemas.openxmlformats.org/officeDocument/2006/math" xmlns:a14="http://schemas.microsoft.com/office/drawing/2010/main" xmlns:ma14="http://schemas.microsoft.com/office/mac/drawingml/2011/main" val="1"/>
+                <ma14:wrappingTextBoxFlag xmlns:ma14="http://schemas.microsoft.com/office/mac/drawingml/2011/main" xmlns:a14="http://schemas.microsoft.com/office/drawing/2010/main" xmlns:m="http://schemas.openxmlformats.org/officeDocument/2006/math" xmlns="" val="1"/>
               </a:ext>
             </a:extLst>
           </p:spPr>
@@ -16030,7 +16112,7 @@
             </a:ln>
             <a:extLst>
               <a:ext uri="{C572A759-6A51-4108-AA02-DFA0A04FC94B}">
-                <ma14:wrappingTextBoxFlag xmlns="" xmlns:m="http://schemas.openxmlformats.org/officeDocument/2006/math" xmlns:a14="http://schemas.microsoft.com/office/drawing/2010/main" xmlns:ma14="http://schemas.microsoft.com/office/mac/drawingml/2011/main" val="1"/>
+                <ma14:wrappingTextBoxFlag xmlns:ma14="http://schemas.microsoft.com/office/mac/drawingml/2011/main" xmlns:a14="http://schemas.microsoft.com/office/drawing/2010/main" xmlns:m="http://schemas.openxmlformats.org/officeDocument/2006/math" xmlns="" val="1"/>
               </a:ext>
             </a:extLst>
           </p:spPr>
@@ -16088,7 +16170,7 @@
             </a:ln>
             <a:extLst>
               <a:ext uri="{C572A759-6A51-4108-AA02-DFA0A04FC94B}">
-                <ma14:wrappingTextBoxFlag xmlns="" xmlns:m="http://schemas.openxmlformats.org/officeDocument/2006/math" xmlns:a14="http://schemas.microsoft.com/office/drawing/2010/main" xmlns:ma14="http://schemas.microsoft.com/office/mac/drawingml/2011/main" val="1"/>
+                <ma14:wrappingTextBoxFlag xmlns:ma14="http://schemas.microsoft.com/office/mac/drawingml/2011/main" xmlns:a14="http://schemas.microsoft.com/office/drawing/2010/main" xmlns:m="http://schemas.openxmlformats.org/officeDocument/2006/math" xmlns="" val="1"/>
               </a:ext>
             </a:extLst>
           </p:spPr>
@@ -16169,7 +16251,7 @@
             <a:effectLst/>
             <a:extLst>
               <a:ext uri="{C572A759-6A51-4108-AA02-DFA0A04FC94B}">
-                <ma14:wrappingTextBoxFlag xmlns="" xmlns:m="http://schemas.openxmlformats.org/officeDocument/2006/math" xmlns:a14="http://schemas.microsoft.com/office/drawing/2010/main" xmlns:ma14="http://schemas.microsoft.com/office/mac/drawingml/2011/main" val="1"/>
+                <ma14:wrappingTextBoxFlag xmlns:ma14="http://schemas.microsoft.com/office/mac/drawingml/2011/main" xmlns:a14="http://schemas.microsoft.com/office/drawing/2010/main" xmlns:m="http://schemas.openxmlformats.org/officeDocument/2006/math" xmlns="" val="1"/>
               </a:ext>
             </a:extLst>
           </p:spPr>
@@ -16242,7 +16324,7 @@
             <a:effectLst/>
             <a:extLst>
               <a:ext uri="{C572A759-6A51-4108-AA02-DFA0A04FC94B}">
-                <ma14:wrappingTextBoxFlag xmlns="" xmlns:m="http://schemas.openxmlformats.org/officeDocument/2006/math" xmlns:a14="http://schemas.microsoft.com/office/drawing/2010/main" xmlns:ma14="http://schemas.microsoft.com/office/mac/drawingml/2011/main" val="1"/>
+                <ma14:wrappingTextBoxFlag xmlns:ma14="http://schemas.microsoft.com/office/mac/drawingml/2011/main" xmlns:a14="http://schemas.microsoft.com/office/drawing/2010/main" xmlns:m="http://schemas.openxmlformats.org/officeDocument/2006/math" xmlns="" val="1"/>
               </a:ext>
             </a:extLst>
           </p:spPr>
@@ -16308,7 +16390,7 @@
             </a:ln>
             <a:extLst>
               <a:ext uri="{C572A759-6A51-4108-AA02-DFA0A04FC94B}">
-                <ma14:wrappingTextBoxFlag xmlns="" xmlns:m="http://schemas.openxmlformats.org/officeDocument/2006/math" xmlns:a14="http://schemas.microsoft.com/office/drawing/2010/main" xmlns:ma14="http://schemas.microsoft.com/office/mac/drawingml/2011/main" val="1"/>
+                <ma14:wrappingTextBoxFlag xmlns:ma14="http://schemas.microsoft.com/office/mac/drawingml/2011/main" xmlns:a14="http://schemas.microsoft.com/office/drawing/2010/main" xmlns:m="http://schemas.openxmlformats.org/officeDocument/2006/math" xmlns="" val="1"/>
               </a:ext>
             </a:extLst>
           </p:spPr>
@@ -16366,7 +16448,7 @@
             </a:ln>
             <a:extLst>
               <a:ext uri="{C572A759-6A51-4108-AA02-DFA0A04FC94B}">
-                <ma14:wrappingTextBoxFlag xmlns="" xmlns:m="http://schemas.openxmlformats.org/officeDocument/2006/math" xmlns:a14="http://schemas.microsoft.com/office/drawing/2010/main" xmlns:ma14="http://schemas.microsoft.com/office/mac/drawingml/2011/main" val="1"/>
+                <ma14:wrappingTextBoxFlag xmlns:ma14="http://schemas.microsoft.com/office/mac/drawingml/2011/main" xmlns:a14="http://schemas.microsoft.com/office/drawing/2010/main" xmlns:m="http://schemas.openxmlformats.org/officeDocument/2006/math" xmlns="" val="1"/>
               </a:ext>
             </a:extLst>
           </p:spPr>
@@ -16447,7 +16529,7 @@
             <a:effectLst/>
             <a:extLst>
               <a:ext uri="{C572A759-6A51-4108-AA02-DFA0A04FC94B}">
-                <ma14:wrappingTextBoxFlag xmlns="" xmlns:m="http://schemas.openxmlformats.org/officeDocument/2006/math" xmlns:a14="http://schemas.microsoft.com/office/drawing/2010/main" xmlns:ma14="http://schemas.microsoft.com/office/mac/drawingml/2011/main" val="1"/>
+                <ma14:wrappingTextBoxFlag xmlns:ma14="http://schemas.microsoft.com/office/mac/drawingml/2011/main" xmlns:a14="http://schemas.microsoft.com/office/drawing/2010/main" xmlns:m="http://schemas.openxmlformats.org/officeDocument/2006/math" xmlns="" val="1"/>
               </a:ext>
             </a:extLst>
           </p:spPr>
@@ -16520,7 +16602,7 @@
             <a:effectLst/>
             <a:extLst>
               <a:ext uri="{C572A759-6A51-4108-AA02-DFA0A04FC94B}">
-                <ma14:wrappingTextBoxFlag xmlns="" xmlns:m="http://schemas.openxmlformats.org/officeDocument/2006/math" xmlns:a14="http://schemas.microsoft.com/office/drawing/2010/main" xmlns:ma14="http://schemas.microsoft.com/office/mac/drawingml/2011/main" val="1"/>
+                <ma14:wrappingTextBoxFlag xmlns:ma14="http://schemas.microsoft.com/office/mac/drawingml/2011/main" xmlns:a14="http://schemas.microsoft.com/office/drawing/2010/main" xmlns:m="http://schemas.openxmlformats.org/officeDocument/2006/math" xmlns="" val="1"/>
               </a:ext>
             </a:extLst>
           </p:spPr>
@@ -16586,7 +16668,7 @@
             </a:ln>
             <a:extLst>
               <a:ext uri="{C572A759-6A51-4108-AA02-DFA0A04FC94B}">
-                <ma14:wrappingTextBoxFlag xmlns="" xmlns:m="http://schemas.openxmlformats.org/officeDocument/2006/math" xmlns:a14="http://schemas.microsoft.com/office/drawing/2010/main" xmlns:ma14="http://schemas.microsoft.com/office/mac/drawingml/2011/main" val="1"/>
+                <ma14:wrappingTextBoxFlag xmlns:ma14="http://schemas.microsoft.com/office/mac/drawingml/2011/main" xmlns:a14="http://schemas.microsoft.com/office/drawing/2010/main" xmlns:m="http://schemas.openxmlformats.org/officeDocument/2006/math" xmlns="" val="1"/>
               </a:ext>
             </a:extLst>
           </p:spPr>
@@ -16644,7 +16726,7 @@
             </a:ln>
             <a:extLst>
               <a:ext uri="{C572A759-6A51-4108-AA02-DFA0A04FC94B}">
-                <ma14:wrappingTextBoxFlag xmlns="" xmlns:m="http://schemas.openxmlformats.org/officeDocument/2006/math" xmlns:a14="http://schemas.microsoft.com/office/drawing/2010/main" xmlns:ma14="http://schemas.microsoft.com/office/mac/drawingml/2011/main" val="1"/>
+                <ma14:wrappingTextBoxFlag xmlns:ma14="http://schemas.microsoft.com/office/mac/drawingml/2011/main" xmlns:a14="http://schemas.microsoft.com/office/drawing/2010/main" xmlns:m="http://schemas.openxmlformats.org/officeDocument/2006/math" xmlns="" val="1"/>
               </a:ext>
             </a:extLst>
           </p:spPr>
@@ -16703,7 +16785,7 @@
           </a:ln>
           <a:extLst>
             <a:ext uri="{C572A759-6A51-4108-AA02-DFA0A04FC94B}">
-              <ma14:wrappingTextBoxFlag xmlns="" xmlns:m="http://schemas.openxmlformats.org/officeDocument/2006/math" xmlns:a14="http://schemas.microsoft.com/office/drawing/2010/main" xmlns:ma14="http://schemas.microsoft.com/office/mac/drawingml/2011/main" val="1"/>
+              <ma14:wrappingTextBoxFlag xmlns:ma14="http://schemas.microsoft.com/office/mac/drawingml/2011/main" xmlns:a14="http://schemas.microsoft.com/office/drawing/2010/main" xmlns:m="http://schemas.openxmlformats.org/officeDocument/2006/math" xmlns="" val="1"/>
             </a:ext>
           </a:extLst>
         </p:spPr>
@@ -16761,7 +16843,7 @@
           </a:ln>
           <a:extLst>
             <a:ext uri="{C572A759-6A51-4108-AA02-DFA0A04FC94B}">
-              <ma14:wrappingTextBoxFlag xmlns="" xmlns:m="http://schemas.openxmlformats.org/officeDocument/2006/math" xmlns:a14="http://schemas.microsoft.com/office/drawing/2010/main" xmlns:ma14="http://schemas.microsoft.com/office/mac/drawingml/2011/main" val="1"/>
+              <ma14:wrappingTextBoxFlag xmlns:ma14="http://schemas.microsoft.com/office/mac/drawingml/2011/main" xmlns:a14="http://schemas.microsoft.com/office/drawing/2010/main" xmlns:m="http://schemas.openxmlformats.org/officeDocument/2006/math" xmlns="" val="1"/>
             </a:ext>
           </a:extLst>
         </p:spPr>
@@ -17005,7 +17087,7 @@
             </a:ln>
             <a:extLst>
               <a:ext uri="{C572A759-6A51-4108-AA02-DFA0A04FC94B}">
-                <ma14:wrappingTextBoxFlag xmlns="" xmlns:m="http://schemas.openxmlformats.org/officeDocument/2006/math" xmlns:a14="http://schemas.microsoft.com/office/drawing/2010/main" xmlns:ma14="http://schemas.microsoft.com/office/mac/drawingml/2011/main" val="1"/>
+                <ma14:wrappingTextBoxFlag xmlns:ma14="http://schemas.microsoft.com/office/mac/drawingml/2011/main" xmlns:a14="http://schemas.microsoft.com/office/drawing/2010/main" xmlns:m="http://schemas.openxmlformats.org/officeDocument/2006/math" xmlns="" val="1"/>
               </a:ext>
             </a:extLst>
           </p:spPr>
@@ -17557,7 +17639,7 @@
             </a:ln>
             <a:extLst>
               <a:ext uri="{C572A759-6A51-4108-AA02-DFA0A04FC94B}">
-                <ma14:wrappingTextBoxFlag xmlns="" xmlns:m="http://schemas.openxmlformats.org/officeDocument/2006/math" xmlns:a14="http://schemas.microsoft.com/office/drawing/2010/main" xmlns:ma14="http://schemas.microsoft.com/office/mac/drawingml/2011/main" val="1"/>
+                <ma14:wrappingTextBoxFlag xmlns:ma14="http://schemas.microsoft.com/office/mac/drawingml/2011/main" xmlns:a14="http://schemas.microsoft.com/office/drawing/2010/main" xmlns:m="http://schemas.openxmlformats.org/officeDocument/2006/math" xmlns="" val="1"/>
               </a:ext>
             </a:extLst>
           </p:spPr>
@@ -18780,7 +18862,7 @@
           </a:prstGeom>
           <a:extLst>
             <a:ext uri="{C572A759-6A51-4108-AA02-DFA0A04FC94B}">
-              <ma14:wrappingTextBoxFlag xmlns="" xmlns:m="http://schemas.openxmlformats.org/officeDocument/2006/math" xmlns:a14="http://schemas.microsoft.com/office/drawing/2010/main" xmlns:ma14="http://schemas.microsoft.com/office/mac/drawingml/2011/main" val="1"/>
+              <ma14:wrappingTextBoxFlag xmlns:ma14="http://schemas.microsoft.com/office/mac/drawingml/2011/main" xmlns:a14="http://schemas.microsoft.com/office/drawing/2010/main" xmlns:m="http://schemas.openxmlformats.org/officeDocument/2006/math" xmlns="" val="1"/>
             </a:ext>
           </a:extLst>
         </p:spPr>
@@ -19527,7 +19609,7 @@
             <a:effectLst/>
             <a:extLst>
               <a:ext uri="{C572A759-6A51-4108-AA02-DFA0A04FC94B}">
-                <ma14:wrappingTextBoxFlag xmlns:ma14="http://schemas.microsoft.com/office/mac/drawingml/2011/main" xmlns:a14="http://schemas.microsoft.com/office/drawing/2010/main" xmlns:m="http://schemas.openxmlformats.org/officeDocument/2006/math" xmlns="" val="1"/>
+                <ma14:wrappingTextBoxFlag xmlns="" xmlns:m="http://schemas.openxmlformats.org/officeDocument/2006/math" xmlns:a14="http://schemas.microsoft.com/office/drawing/2010/main" xmlns:ma14="http://schemas.microsoft.com/office/mac/drawingml/2011/main" val="1"/>
               </a:ext>
             </a:extLst>
           </p:spPr>
@@ -19810,7 +19892,7 @@
             <a:effectLst/>
             <a:extLst>
               <a:ext uri="{C572A759-6A51-4108-AA02-DFA0A04FC94B}">
-                <ma14:wrappingTextBoxFlag xmlns:ma14="http://schemas.microsoft.com/office/mac/drawingml/2011/main" xmlns:a14="http://schemas.microsoft.com/office/drawing/2010/main" xmlns:m="http://schemas.openxmlformats.org/officeDocument/2006/math" xmlns="" val="1"/>
+                <ma14:wrappingTextBoxFlag xmlns="" xmlns:m="http://schemas.openxmlformats.org/officeDocument/2006/math" xmlns:a14="http://schemas.microsoft.com/office/drawing/2010/main" xmlns:ma14="http://schemas.microsoft.com/office/mac/drawingml/2011/main" val="1"/>
               </a:ext>
             </a:extLst>
           </p:spPr>
@@ -20944,7 +21026,7 @@
             <a:effectLst/>
             <a:extLst>
               <a:ext uri="{C572A759-6A51-4108-AA02-DFA0A04FC94B}">
-                <ma14:wrappingTextBoxFlag xmlns="" xmlns:m="http://schemas.openxmlformats.org/officeDocument/2006/math" xmlns:a14="http://schemas.microsoft.com/office/drawing/2010/main" xmlns:ma14="http://schemas.microsoft.com/office/mac/drawingml/2011/main" val="1"/>
+                <ma14:wrappingTextBoxFlag xmlns:ma14="http://schemas.microsoft.com/office/mac/drawingml/2011/main" xmlns:a14="http://schemas.microsoft.com/office/drawing/2010/main" xmlns:m="http://schemas.openxmlformats.org/officeDocument/2006/math" xmlns="" val="1"/>
               </a:ext>
             </a:extLst>
           </p:spPr>
@@ -21209,7 +21291,7 @@
             <a:effectLst/>
             <a:extLst>
               <a:ext uri="{C572A759-6A51-4108-AA02-DFA0A04FC94B}">
-                <ma14:wrappingTextBoxFlag xmlns="" xmlns:m="http://schemas.openxmlformats.org/officeDocument/2006/math" xmlns:a14="http://schemas.microsoft.com/office/drawing/2010/main" xmlns:ma14="http://schemas.microsoft.com/office/mac/drawingml/2011/main" val="1"/>
+                <ma14:wrappingTextBoxFlag xmlns:ma14="http://schemas.microsoft.com/office/mac/drawingml/2011/main" xmlns:a14="http://schemas.microsoft.com/office/drawing/2010/main" xmlns:m="http://schemas.openxmlformats.org/officeDocument/2006/math" xmlns="" val="1"/>
               </a:ext>
             </a:extLst>
           </p:spPr>
@@ -22799,7 +22881,7 @@
             <a:effectLst/>
             <a:extLst>
               <a:ext uri="{C572A759-6A51-4108-AA02-DFA0A04FC94B}">
-                <ma14:wrappingTextBoxFlag xmlns:ma14="http://schemas.microsoft.com/office/mac/drawingml/2011/main" xmlns:a14="http://schemas.microsoft.com/office/drawing/2010/main" xmlns:m="http://schemas.openxmlformats.org/officeDocument/2006/math" xmlns="" val="1"/>
+                <ma14:wrappingTextBoxFlag xmlns="" xmlns:m="http://schemas.openxmlformats.org/officeDocument/2006/math" xmlns:a14="http://schemas.microsoft.com/office/drawing/2010/main" xmlns:ma14="http://schemas.microsoft.com/office/mac/drawingml/2011/main" val="1"/>
               </a:ext>
             </a:extLst>
           </p:spPr>
@@ -27115,7 +27197,7 @@
             <a:effectLst/>
             <a:extLst>
               <a:ext uri="{C572A759-6A51-4108-AA02-DFA0A04FC94B}">
-                <ma14:wrappingTextBoxFlag xmlns:ma14="http://schemas.microsoft.com/office/mac/drawingml/2011/main" xmlns:a14="http://schemas.microsoft.com/office/drawing/2010/main" xmlns:m="http://schemas.openxmlformats.org/officeDocument/2006/math" xmlns="" val="1"/>
+                <ma14:wrappingTextBoxFlag xmlns="" xmlns:m="http://schemas.openxmlformats.org/officeDocument/2006/math" xmlns:a14="http://schemas.microsoft.com/office/drawing/2010/main" xmlns:ma14="http://schemas.microsoft.com/office/mac/drawingml/2011/main" val="1"/>
               </a:ext>
             </a:extLst>
           </p:spPr>
@@ -27418,7 +27500,7 @@
           </a:prstGeom>
           <a:extLst>
             <a:ext uri="{C572A759-6A51-4108-AA02-DFA0A04FC94B}">
-              <ma14:wrappingTextBoxFlag xmlns:ma14="http://schemas.microsoft.com/office/mac/drawingml/2011/main" xmlns:a14="http://schemas.microsoft.com/office/drawing/2010/main" xmlns:m="http://schemas.openxmlformats.org/officeDocument/2006/math" xmlns="" val="1"/>
+              <ma14:wrappingTextBoxFlag xmlns="" xmlns:m="http://schemas.openxmlformats.org/officeDocument/2006/math" xmlns:a14="http://schemas.microsoft.com/office/drawing/2010/main" xmlns:ma14="http://schemas.microsoft.com/office/mac/drawingml/2011/main" val="1"/>
             </a:ext>
           </a:extLst>
         </p:spPr>
@@ -27456,7 +27538,7 @@
           </a:ln>
           <a:extLst>
             <a:ext uri="{C572A759-6A51-4108-AA02-DFA0A04FC94B}">
-              <ma14:wrappingTextBoxFlag xmlns:ma14="http://schemas.microsoft.com/office/mac/drawingml/2011/main" xmlns:a14="http://schemas.microsoft.com/office/drawing/2010/main" xmlns:m="http://schemas.openxmlformats.org/officeDocument/2006/math" xmlns="" val="1"/>
+              <ma14:wrappingTextBoxFlag xmlns="" xmlns:m="http://schemas.openxmlformats.org/officeDocument/2006/math" xmlns:a14="http://schemas.microsoft.com/office/drawing/2010/main" xmlns:ma14="http://schemas.microsoft.com/office/mac/drawingml/2011/main" val="1"/>
             </a:ext>
           </a:extLst>
         </p:spPr>
@@ -28523,7 +28605,7 @@
           </a:ln>
           <a:extLst>
             <a:ext uri="{C572A759-6A51-4108-AA02-DFA0A04FC94B}">
-              <ma14:wrappingTextBoxFlag xmlns:ma14="http://schemas.microsoft.com/office/mac/drawingml/2011/main" xmlns:a14="http://schemas.microsoft.com/office/drawing/2010/main" xmlns:m="http://schemas.openxmlformats.org/officeDocument/2006/math" xmlns="" val="1"/>
+              <ma14:wrappingTextBoxFlag xmlns="" xmlns:m="http://schemas.openxmlformats.org/officeDocument/2006/math" xmlns:a14="http://schemas.microsoft.com/office/drawing/2010/main" xmlns:ma14="http://schemas.microsoft.com/office/mac/drawingml/2011/main" val="1"/>
             </a:ext>
           </a:extLst>
         </p:spPr>
@@ -29555,7 +29637,7 @@
           </a:ln>
           <a:extLst>
             <a:ext uri="{C572A759-6A51-4108-AA02-DFA0A04FC94B}">
-              <ma14:wrappingTextBoxFlag xmlns:ma14="http://schemas.microsoft.com/office/mac/drawingml/2011/main" xmlns:a14="http://schemas.microsoft.com/office/drawing/2010/main" xmlns:m="http://schemas.openxmlformats.org/officeDocument/2006/math" xmlns="" val="1"/>
+              <ma14:wrappingTextBoxFlag xmlns="" xmlns:m="http://schemas.openxmlformats.org/officeDocument/2006/math" xmlns:a14="http://schemas.microsoft.com/office/drawing/2010/main" xmlns:ma14="http://schemas.microsoft.com/office/mac/drawingml/2011/main" val="1"/>
             </a:ext>
           </a:extLst>
         </p:spPr>
@@ -29613,7 +29695,7 @@
           </a:ln>
           <a:extLst>
             <a:ext uri="{C572A759-6A51-4108-AA02-DFA0A04FC94B}">
-              <ma14:wrappingTextBoxFlag xmlns:ma14="http://schemas.microsoft.com/office/mac/drawingml/2011/main" xmlns:a14="http://schemas.microsoft.com/office/drawing/2010/main" xmlns:m="http://schemas.openxmlformats.org/officeDocument/2006/math" xmlns="" val="1"/>
+              <ma14:wrappingTextBoxFlag xmlns="" xmlns:m="http://schemas.openxmlformats.org/officeDocument/2006/math" xmlns:a14="http://schemas.microsoft.com/office/drawing/2010/main" xmlns:ma14="http://schemas.microsoft.com/office/mac/drawingml/2011/main" val="1"/>
             </a:ext>
           </a:extLst>
         </p:spPr>
@@ -29657,7 +29739,7 @@
           </a:ln>
           <a:extLst>
             <a:ext uri="{C572A759-6A51-4108-AA02-DFA0A04FC94B}">
-              <ma14:wrappingTextBoxFlag xmlns:ma14="http://schemas.microsoft.com/office/mac/drawingml/2011/main" xmlns:a14="http://schemas.microsoft.com/office/drawing/2010/main" xmlns:m="http://schemas.openxmlformats.org/officeDocument/2006/math" xmlns="" val="1"/>
+              <ma14:wrappingTextBoxFlag xmlns="" xmlns:m="http://schemas.openxmlformats.org/officeDocument/2006/math" xmlns:a14="http://schemas.microsoft.com/office/drawing/2010/main" xmlns:ma14="http://schemas.microsoft.com/office/mac/drawingml/2011/main" val="1"/>
             </a:ext>
           </a:extLst>
         </p:spPr>
@@ -29693,7 +29775,7 @@
           </a:ln>
           <a:extLst>
             <a:ext uri="{C572A759-6A51-4108-AA02-DFA0A04FC94B}">
-              <ma14:wrappingTextBoxFlag xmlns:ma14="http://schemas.microsoft.com/office/mac/drawingml/2011/main" xmlns:a14="http://schemas.microsoft.com/office/drawing/2010/main" xmlns:m="http://schemas.openxmlformats.org/officeDocument/2006/math" xmlns="" val="1"/>
+              <ma14:wrappingTextBoxFlag xmlns="" xmlns:m="http://schemas.openxmlformats.org/officeDocument/2006/math" xmlns:a14="http://schemas.microsoft.com/office/drawing/2010/main" xmlns:ma14="http://schemas.microsoft.com/office/mac/drawingml/2011/main" val="1"/>
             </a:ext>
           </a:extLst>
         </p:spPr>
@@ -29781,7 +29863,7 @@
             <a:effectLst/>
             <a:extLst>
               <a:ext uri="{C572A759-6A51-4108-AA02-DFA0A04FC94B}">
-                <ma14:wrappingTextBoxFlag xmlns:ma14="http://schemas.microsoft.com/office/mac/drawingml/2011/main" xmlns:a14="http://schemas.microsoft.com/office/drawing/2010/main" xmlns:m="http://schemas.openxmlformats.org/officeDocument/2006/math" xmlns="" val="1"/>
+                <ma14:wrappingTextBoxFlag xmlns="" xmlns:m="http://schemas.openxmlformats.org/officeDocument/2006/math" xmlns:a14="http://schemas.microsoft.com/office/drawing/2010/main" xmlns:ma14="http://schemas.microsoft.com/office/mac/drawingml/2011/main" val="1"/>
               </a:ext>
             </a:extLst>
           </p:spPr>
@@ -30043,7 +30125,7 @@
             <a:effectLst/>
             <a:extLst>
               <a:ext uri="{C572A759-6A51-4108-AA02-DFA0A04FC94B}">
-                <ma14:wrappingTextBoxFlag xmlns:ma14="http://schemas.microsoft.com/office/mac/drawingml/2011/main" xmlns:a14="http://schemas.microsoft.com/office/drawing/2010/main" xmlns:m="http://schemas.openxmlformats.org/officeDocument/2006/math" xmlns="" val="1"/>
+                <ma14:wrappingTextBoxFlag xmlns="" xmlns:m="http://schemas.openxmlformats.org/officeDocument/2006/math" xmlns:a14="http://schemas.microsoft.com/office/drawing/2010/main" xmlns:ma14="http://schemas.microsoft.com/office/mac/drawingml/2011/main" val="1"/>
               </a:ext>
             </a:extLst>
           </p:spPr>
@@ -31774,7 +31856,7 @@
           </a:prstGeom>
           <a:extLst>
             <a:ext uri="{C572A759-6A51-4108-AA02-DFA0A04FC94B}">
-              <ma14:wrappingTextBoxFlag xmlns:ma14="http://schemas.microsoft.com/office/mac/drawingml/2011/main" xmlns:a14="http://schemas.microsoft.com/office/drawing/2010/main" xmlns:m="http://schemas.openxmlformats.org/officeDocument/2006/math" xmlns="" val="1"/>
+              <ma14:wrappingTextBoxFlag xmlns="" xmlns:m="http://schemas.openxmlformats.org/officeDocument/2006/math" xmlns:a14="http://schemas.microsoft.com/office/drawing/2010/main" xmlns:ma14="http://schemas.microsoft.com/office/mac/drawingml/2011/main" val="1"/>
             </a:ext>
           </a:extLst>
         </p:spPr>
@@ -32164,7 +32246,7 @@
               </a:effectLst>
               <a:extLst>
                 <a:ext uri="{C572A759-6A51-4108-AA02-DFA0A04FC94B}">
-                  <ma14:wrappingTextBoxFlag xmlns:ma14="http://schemas.microsoft.com/office/mac/drawingml/2011/main" xmlns:a14="http://schemas.microsoft.com/office/drawing/2010/main" xmlns:m="http://schemas.openxmlformats.org/officeDocument/2006/math" xmlns="" val="1"/>
+                  <ma14:wrappingTextBoxFlag xmlns="" xmlns:m="http://schemas.openxmlformats.org/officeDocument/2006/math" xmlns:a14="http://schemas.microsoft.com/office/drawing/2010/main" xmlns:ma14="http://schemas.microsoft.com/office/mac/drawingml/2011/main" val="1"/>
                 </a:ext>
               </a:extLst>
             </p:spPr>
@@ -32234,7 +32316,7 @@
               </a:effectLst>
               <a:extLst>
                 <a:ext uri="{C572A759-6A51-4108-AA02-DFA0A04FC94B}">
-                  <ma14:wrappingTextBoxFlag xmlns:ma14="http://schemas.microsoft.com/office/mac/drawingml/2011/main" xmlns:a14="http://schemas.microsoft.com/office/drawing/2010/main" xmlns:m="http://schemas.openxmlformats.org/officeDocument/2006/math" xmlns="" val="1"/>
+                  <ma14:wrappingTextBoxFlag xmlns="" xmlns:m="http://schemas.openxmlformats.org/officeDocument/2006/math" xmlns:a14="http://schemas.microsoft.com/office/drawing/2010/main" xmlns:ma14="http://schemas.microsoft.com/office/mac/drawingml/2011/main" val="1"/>
                 </a:ext>
               </a:extLst>
             </p:spPr>
@@ -32302,7 +32384,7 @@
               </a:effectLst>
               <a:extLst>
                 <a:ext uri="{C572A759-6A51-4108-AA02-DFA0A04FC94B}">
-                  <ma14:wrappingTextBoxFlag xmlns:ma14="http://schemas.microsoft.com/office/mac/drawingml/2011/main" xmlns:a14="http://schemas.microsoft.com/office/drawing/2010/main" xmlns:m="http://schemas.openxmlformats.org/officeDocument/2006/math" xmlns="" val="1"/>
+                  <ma14:wrappingTextBoxFlag xmlns="" xmlns:m="http://schemas.openxmlformats.org/officeDocument/2006/math" xmlns:a14="http://schemas.microsoft.com/office/drawing/2010/main" xmlns:ma14="http://schemas.microsoft.com/office/mac/drawingml/2011/main" val="1"/>
                 </a:ext>
               </a:extLst>
             </p:spPr>
@@ -32390,7 +32472,7 @@
                 </a:effectLst>
                 <a:extLst>
                   <a:ext uri="{C572A759-6A51-4108-AA02-DFA0A04FC94B}">
-                    <ma14:wrappingTextBoxFlag xmlns:ma14="http://schemas.microsoft.com/office/mac/drawingml/2011/main" xmlns:a14="http://schemas.microsoft.com/office/drawing/2010/main" xmlns:m="http://schemas.openxmlformats.org/officeDocument/2006/math" xmlns="" val="1"/>
+                    <ma14:wrappingTextBoxFlag xmlns="" xmlns:m="http://schemas.openxmlformats.org/officeDocument/2006/math" xmlns:a14="http://schemas.microsoft.com/office/drawing/2010/main" xmlns:ma14="http://schemas.microsoft.com/office/mac/drawingml/2011/main" val="1"/>
                   </a:ext>
                 </a:extLst>
               </p:spPr>
@@ -32568,7 +32650,7 @@
                   <a:effectLst/>
                   <a:extLst>
                     <a:ext uri="{C572A759-6A51-4108-AA02-DFA0A04FC94B}">
-                      <ma14:wrappingTextBoxFlag xmlns:ma14="http://schemas.microsoft.com/office/mac/drawingml/2011/main" xmlns:a14="http://schemas.microsoft.com/office/drawing/2010/main" xmlns:m="http://schemas.openxmlformats.org/officeDocument/2006/math" xmlns="" val="1"/>
+                      <ma14:wrappingTextBoxFlag xmlns="" xmlns:m="http://schemas.openxmlformats.org/officeDocument/2006/math" xmlns:a14="http://schemas.microsoft.com/office/drawing/2010/main" xmlns:ma14="http://schemas.microsoft.com/office/mac/drawingml/2011/main" val="1"/>
                     </a:ext>
                   </a:extLst>
                 </p:spPr>
@@ -32768,7 +32850,7 @@
                   <a:effectLst/>
                   <a:extLst>
                     <a:ext uri="{C572A759-6A51-4108-AA02-DFA0A04FC94B}">
-                      <ma14:wrappingTextBoxFlag xmlns:ma14="http://schemas.microsoft.com/office/mac/drawingml/2011/main" xmlns:a14="http://schemas.microsoft.com/office/drawing/2010/main" xmlns:m="http://schemas.openxmlformats.org/officeDocument/2006/math" xmlns="" val="1"/>
+                      <ma14:wrappingTextBoxFlag xmlns="" xmlns:m="http://schemas.openxmlformats.org/officeDocument/2006/math" xmlns:a14="http://schemas.microsoft.com/office/drawing/2010/main" xmlns:ma14="http://schemas.microsoft.com/office/mac/drawingml/2011/main" val="1"/>
                     </a:ext>
                   </a:extLst>
                 </p:spPr>
@@ -32858,7 +32940,7 @@
                 </a:effectLst>
                 <a:extLst>
                   <a:ext uri="{C572A759-6A51-4108-AA02-DFA0A04FC94B}">
-                    <ma14:wrappingTextBoxFlag xmlns:ma14="http://schemas.microsoft.com/office/mac/drawingml/2011/main" xmlns:a14="http://schemas.microsoft.com/office/drawing/2010/main" xmlns:m="http://schemas.openxmlformats.org/officeDocument/2006/math" xmlns="" val="1"/>
+                    <ma14:wrappingTextBoxFlag xmlns="" xmlns:m="http://schemas.openxmlformats.org/officeDocument/2006/math" xmlns:a14="http://schemas.microsoft.com/office/drawing/2010/main" xmlns:ma14="http://schemas.microsoft.com/office/mac/drawingml/2011/main" val="1"/>
                   </a:ext>
                 </a:extLst>
               </p:spPr>
@@ -33036,7 +33118,7 @@
                   <a:effectLst/>
                   <a:extLst>
                     <a:ext uri="{C572A759-6A51-4108-AA02-DFA0A04FC94B}">
-                      <ma14:wrappingTextBoxFlag xmlns:ma14="http://schemas.microsoft.com/office/mac/drawingml/2011/main" xmlns:a14="http://schemas.microsoft.com/office/drawing/2010/main" xmlns:m="http://schemas.openxmlformats.org/officeDocument/2006/math" xmlns="" val="1"/>
+                      <ma14:wrappingTextBoxFlag xmlns="" xmlns:m="http://schemas.openxmlformats.org/officeDocument/2006/math" xmlns:a14="http://schemas.microsoft.com/office/drawing/2010/main" xmlns:ma14="http://schemas.microsoft.com/office/mac/drawingml/2011/main" val="1"/>
                     </a:ext>
                   </a:extLst>
                 </p:spPr>
@@ -33126,7 +33208,7 @@
                 </a:effectLst>
                 <a:extLst>
                   <a:ext uri="{C572A759-6A51-4108-AA02-DFA0A04FC94B}">
-                    <ma14:wrappingTextBoxFlag xmlns:ma14="http://schemas.microsoft.com/office/mac/drawingml/2011/main" xmlns:a14="http://schemas.microsoft.com/office/drawing/2010/main" xmlns:m="http://schemas.openxmlformats.org/officeDocument/2006/math" xmlns="" val="1"/>
+                    <ma14:wrappingTextBoxFlag xmlns="" xmlns:m="http://schemas.openxmlformats.org/officeDocument/2006/math" xmlns:a14="http://schemas.microsoft.com/office/drawing/2010/main" xmlns:ma14="http://schemas.microsoft.com/office/mac/drawingml/2011/main" val="1"/>
                   </a:ext>
                 </a:extLst>
               </p:spPr>
@@ -33304,7 +33386,7 @@
                   <a:effectLst/>
                   <a:extLst>
                     <a:ext uri="{C572A759-6A51-4108-AA02-DFA0A04FC94B}">
-                      <ma14:wrappingTextBoxFlag xmlns:ma14="http://schemas.microsoft.com/office/mac/drawingml/2011/main" xmlns:a14="http://schemas.microsoft.com/office/drawing/2010/main" xmlns:m="http://schemas.openxmlformats.org/officeDocument/2006/math" xmlns="" val="1"/>
+                      <ma14:wrappingTextBoxFlag xmlns="" xmlns:m="http://schemas.openxmlformats.org/officeDocument/2006/math" xmlns:a14="http://schemas.microsoft.com/office/drawing/2010/main" xmlns:ma14="http://schemas.microsoft.com/office/mac/drawingml/2011/main" val="1"/>
                     </a:ext>
                   </a:extLst>
                 </p:spPr>
@@ -33375,7 +33457,7 @@
             </a:effectLst>
             <a:extLst>
               <a:ext uri="{C572A759-6A51-4108-AA02-DFA0A04FC94B}">
-                <ma14:wrappingTextBoxFlag xmlns:ma14="http://schemas.microsoft.com/office/mac/drawingml/2011/main" xmlns:a14="http://schemas.microsoft.com/office/drawing/2010/main" xmlns:m="http://schemas.openxmlformats.org/officeDocument/2006/math" xmlns="" val="1"/>
+                <ma14:wrappingTextBoxFlag xmlns="" xmlns:m="http://schemas.openxmlformats.org/officeDocument/2006/math" xmlns:a14="http://schemas.microsoft.com/office/drawing/2010/main" xmlns:ma14="http://schemas.microsoft.com/office/mac/drawingml/2011/main" val="1"/>
               </a:ext>
             </a:extLst>
           </p:spPr>
@@ -33602,7 +33684,7 @@
           </a:prstGeom>
           <a:extLst>
             <a:ext uri="{C572A759-6A51-4108-AA02-DFA0A04FC94B}">
-              <ma14:wrappingTextBoxFlag xmlns:ma14="http://schemas.microsoft.com/office/mac/drawingml/2011/main" xmlns:a14="http://schemas.microsoft.com/office/drawing/2010/main" xmlns:m="http://schemas.openxmlformats.org/officeDocument/2006/math" xmlns="" val="1"/>
+              <ma14:wrappingTextBoxFlag xmlns="" xmlns:m="http://schemas.openxmlformats.org/officeDocument/2006/math" xmlns:a14="http://schemas.microsoft.com/office/drawing/2010/main" xmlns:ma14="http://schemas.microsoft.com/office/mac/drawingml/2011/main" val="1"/>
             </a:ext>
           </a:extLst>
         </p:spPr>
@@ -34540,7 +34622,7 @@
           </a:ln>
           <a:extLst>
             <a:ext uri="{C572A759-6A51-4108-AA02-DFA0A04FC94B}">
-              <ma14:wrappingTextBoxFlag xmlns="" xmlns:m="http://schemas.openxmlformats.org/officeDocument/2006/math" xmlns:a14="http://schemas.microsoft.com/office/drawing/2010/main" xmlns:ma14="http://schemas.microsoft.com/office/mac/drawingml/2011/main" val="1"/>
+              <ma14:wrappingTextBoxFlag xmlns:ma14="http://schemas.microsoft.com/office/mac/drawingml/2011/main" xmlns:a14="http://schemas.microsoft.com/office/drawing/2010/main" xmlns:m="http://schemas.openxmlformats.org/officeDocument/2006/math" xmlns="" val="1"/>
             </a:ext>
           </a:extLst>
         </p:spPr>
@@ -36601,7 +36683,7 @@
           </a:ln>
           <a:extLst>
             <a:ext uri="{C572A759-6A51-4108-AA02-DFA0A04FC94B}">
-              <ma14:wrappingTextBoxFlag xmlns:ma14="http://schemas.microsoft.com/office/mac/drawingml/2011/main" xmlns:a14="http://schemas.microsoft.com/office/drawing/2010/main" xmlns:m="http://schemas.openxmlformats.org/officeDocument/2006/math" xmlns="" val="1"/>
+              <ma14:wrappingTextBoxFlag xmlns="" xmlns:m="http://schemas.openxmlformats.org/officeDocument/2006/math" xmlns:a14="http://schemas.microsoft.com/office/drawing/2010/main" xmlns:ma14="http://schemas.microsoft.com/office/mac/drawingml/2011/main" val="1"/>
             </a:ext>
           </a:extLst>
         </p:spPr>
@@ -37383,7 +37465,7 @@
           </a:ln>
           <a:extLst>
             <a:ext uri="{C572A759-6A51-4108-AA02-DFA0A04FC94B}">
-              <ma14:wrappingTextBoxFlag xmlns:ma14="http://schemas.microsoft.com/office/mac/drawingml/2011/main" xmlns:a14="http://schemas.microsoft.com/office/drawing/2010/main" xmlns:m="http://schemas.openxmlformats.org/officeDocument/2006/math" xmlns="" val="1"/>
+              <ma14:wrappingTextBoxFlag xmlns="" xmlns:m="http://schemas.openxmlformats.org/officeDocument/2006/math" xmlns:a14="http://schemas.microsoft.com/office/drawing/2010/main" xmlns:ma14="http://schemas.microsoft.com/office/mac/drawingml/2011/main" val="1"/>
             </a:ext>
           </a:extLst>
         </p:spPr>
@@ -40772,7 +40854,7 @@
           <a:p>
             <a:r>
               <a:rPr lang="en-US" baseline="0" dirty="0"/>
-              <a:t>Typically via a </a:t>
+              <a:t>Typically, via a </a:t>
             </a:r>
             <a:r>
               <a:rPr lang="en-US" b="1" baseline="0" dirty="0"/>
@@ -40991,7 +41073,15 @@
           <a:p>
             <a:r>
               <a:rPr lang="en-US" dirty="0"/>
-              <a:t>A computation is suspended when it hits an ‘await’. The runtime system (node.js, for us) chooses what to do next. (In addition to whatever asynchronous IO it may be doing).</a:t>
+              <a:t>A computation is </a:t>
+            </a:r>
+            <a:r>
+              <a:rPr lang="en-US" i="1" dirty="0"/>
+              <a:t>suspended</a:t>
+            </a:r>
+            <a:r>
+              <a:rPr lang="en-US" dirty="0"/>
+              <a:t> when it hits an ‘await’. The runtime system (node.js, for us) chooses what to do next. (In addition to whatever asynchronous IO it may be doing).</a:t>
             </a:r>
           </a:p>
         </p:txBody>
@@ -42964,7 +43054,7 @@
               <a:rPr lang="en-US" sz="2400" dirty="0">
                 <a:effectLst/>
               </a:rPr>
-              <a:t> suspends the current computation until the promise </a:t>
+              <a:t> suspends the current computation until the response is received (or the promise </a:t>
             </a:r>
             <a:r>
               <a:rPr lang="en-US" sz="2400" b="1" dirty="0">
@@ -42976,7 +43066,7 @@
               <a:rPr lang="en-US" sz="2400" dirty="0">
                 <a:effectLst/>
               </a:rPr>
-              <a:t> returns.</a:t>
+              <a:t> is resolved).</a:t>
             </a:r>
           </a:p>
           <a:p>
@@ -42998,19 +43088,6 @@
               </a:rPr>
               <a:t>) can run.</a:t>
             </a:r>
-          </a:p>
-          <a:p>
-            <a:pPr marL="0" indent="0">
-              <a:buNone/>
-            </a:pPr>
-            <a:endParaRPr lang="en-US" sz="2400" b="0" dirty="0">
-              <a:effectLst/>
-            </a:endParaRPr>
-          </a:p>
-          <a:p>
-            <a:endParaRPr lang="en-US" sz="2400" b="0" dirty="0">
-              <a:effectLst/>
-            </a:endParaRPr>
           </a:p>
           <a:p>
             <a:pPr marL="0" indent="0">

</xml_diff>

<commit_message>
updated notes in slides to highlight important points
</commit_message>
<xml_diff>
--- a/Slides/Module 05 Concurrency Patterns in Typescript.pptx
+++ b/Slides/Module 05 Concurrency Patterns in Typescript.pptx
@@ -2973,6 +2973,15 @@
               <a:t> to be returned. Since get is itself async function, it returns the promise immediately which allows you to continue executing the suspended function.</a:t>
             </a:r>
           </a:p>
+          <a:p>
+            <a:endParaRPr lang="en-US" dirty="0"/>
+          </a:p>
+          <a:p>
+            <a:r>
+              <a:rPr lang="en-US" dirty="0"/>
+              <a:t>It is IMPORTANT to highlight that the function does not complete due to “await” but the control IMMEDIATELY returns to the current thread …. Which ALLOWS THE CURRRENT THREAD TO COMPLETE.</a:t>
+            </a:r>
+          </a:p>
         </p:txBody>
       </p:sp>
     </p:spTree>
@@ -3040,8 +3049,41 @@
           <a:p>
             <a:r>
               <a:rPr lang="en-US" dirty="0"/>
-              <a:t>When one request starts, this code proceeds to the next one.</a:t>
-            </a:r>
+              <a:t>When you call </a:t>
+            </a:r>
+            <a:r>
+              <a:rPr lang="en-US" dirty="0" err="1"/>
+              <a:t>makeOneGetRequest</a:t>
+            </a:r>
+            <a:r>
+              <a:rPr lang="en-US" dirty="0"/>
+              <a:t>, one request starts, the function makes the </a:t>
+            </a:r>
+            <a:r>
+              <a:rPr lang="en-US" dirty="0" err="1"/>
+              <a:t>axios.get</a:t>
+            </a:r>
+            <a:r>
+              <a:rPr lang="en-US" dirty="0"/>
+              <a:t> request, suspends itself due to “await”, a promise is returned immediately which gives the control back to the calling function ….</a:t>
+            </a:r>
+          </a:p>
+          <a:p>
+            <a:r>
+              <a:rPr lang="en-US" dirty="0"/>
+              <a:t>this code proceeds to the second </a:t>
+            </a:r>
+            <a:r>
+              <a:rPr lang="en-US" dirty="0" err="1"/>
+              <a:t>makeOneGetRequest</a:t>
+            </a:r>
+            <a:r>
+              <a:rPr lang="en-US" dirty="0"/>
+              <a:t> call.</a:t>
+            </a:r>
+          </a:p>
+          <a:p>
+            <a:endParaRPr lang="en-US" dirty="0"/>
           </a:p>
           <a:p>
             <a:r>
@@ -3051,6 +3093,12 @@
           </a:p>
           <a:p>
             <a:endParaRPr lang="en-US" dirty="0"/>
+          </a:p>
+          <a:p>
+            <a:r>
+              <a:rPr lang="en-US" dirty="0"/>
+              <a:t>Three tasks were suspended …. They get executed in some order</a:t>
+            </a:r>
           </a:p>
           <a:p>
             <a:r>
@@ -13357,7 +13405,7 @@
           </a:ln>
           <a:extLst>
             <a:ext uri="{C572A759-6A51-4108-AA02-DFA0A04FC94B}">
-              <ma14:wrappingTextBoxFlag xmlns:ma14="http://schemas.microsoft.com/office/mac/drawingml/2011/main" xmlns:a14="http://schemas.microsoft.com/office/drawing/2010/main" xmlns:m="http://schemas.openxmlformats.org/officeDocument/2006/math" xmlns="" val="1"/>
+              <ma14:wrappingTextBoxFlag xmlns="" xmlns:m="http://schemas.openxmlformats.org/officeDocument/2006/math" xmlns:a14="http://schemas.microsoft.com/office/drawing/2010/main" xmlns:ma14="http://schemas.microsoft.com/office/mac/drawingml/2011/main" val="1"/>
             </a:ext>
           </a:extLst>
         </p:spPr>
@@ -13946,7 +13994,7 @@
           </a:ln>
           <a:extLst>
             <a:ext uri="{C572A759-6A51-4108-AA02-DFA0A04FC94B}">
-              <ma14:wrappingTextBoxFlag xmlns:ma14="http://schemas.microsoft.com/office/mac/drawingml/2011/main" xmlns:a14="http://schemas.microsoft.com/office/drawing/2010/main" xmlns:m="http://schemas.openxmlformats.org/officeDocument/2006/math" xmlns="" val="1"/>
+              <ma14:wrappingTextBoxFlag xmlns="" xmlns:m="http://schemas.openxmlformats.org/officeDocument/2006/math" xmlns:a14="http://schemas.microsoft.com/office/drawing/2010/main" xmlns:ma14="http://schemas.microsoft.com/office/mac/drawingml/2011/main" val="1"/>
             </a:ext>
           </a:extLst>
         </p:spPr>
@@ -15147,7 +15195,7 @@
             <a:effectLst/>
             <a:extLst>
               <a:ext uri="{C572A759-6A51-4108-AA02-DFA0A04FC94B}">
-                <ma14:wrappingTextBoxFlag xmlns:ma14="http://schemas.microsoft.com/office/mac/drawingml/2011/main" xmlns:a14="http://schemas.microsoft.com/office/drawing/2010/main" xmlns:m="http://schemas.openxmlformats.org/officeDocument/2006/math" xmlns="" val="1"/>
+                <ma14:wrappingTextBoxFlag xmlns="" xmlns:m="http://schemas.openxmlformats.org/officeDocument/2006/math" xmlns:a14="http://schemas.microsoft.com/office/drawing/2010/main" xmlns:ma14="http://schemas.microsoft.com/office/mac/drawingml/2011/main" val="1"/>
               </a:ext>
             </a:extLst>
           </p:spPr>
@@ -15216,7 +15264,7 @@
             <a:effectLst/>
             <a:extLst>
               <a:ext uri="{C572A759-6A51-4108-AA02-DFA0A04FC94B}">
-                <ma14:wrappingTextBoxFlag xmlns:ma14="http://schemas.microsoft.com/office/mac/drawingml/2011/main" xmlns:a14="http://schemas.microsoft.com/office/drawing/2010/main" xmlns:m="http://schemas.openxmlformats.org/officeDocument/2006/math" xmlns="" val="1"/>
+                <ma14:wrappingTextBoxFlag xmlns="" xmlns:m="http://schemas.openxmlformats.org/officeDocument/2006/math" xmlns:a14="http://schemas.microsoft.com/office/drawing/2010/main" xmlns:ma14="http://schemas.microsoft.com/office/mac/drawingml/2011/main" val="1"/>
               </a:ext>
             </a:extLst>
           </p:spPr>
@@ -15282,7 +15330,7 @@
             </a:ln>
             <a:extLst>
               <a:ext uri="{C572A759-6A51-4108-AA02-DFA0A04FC94B}">
-                <ma14:wrappingTextBoxFlag xmlns:ma14="http://schemas.microsoft.com/office/mac/drawingml/2011/main" xmlns:a14="http://schemas.microsoft.com/office/drawing/2010/main" xmlns:m="http://schemas.openxmlformats.org/officeDocument/2006/math" xmlns="" val="1"/>
+                <ma14:wrappingTextBoxFlag xmlns="" xmlns:m="http://schemas.openxmlformats.org/officeDocument/2006/math" xmlns:a14="http://schemas.microsoft.com/office/drawing/2010/main" xmlns:ma14="http://schemas.microsoft.com/office/mac/drawingml/2011/main" val="1"/>
               </a:ext>
             </a:extLst>
           </p:spPr>
@@ -15340,7 +15388,7 @@
             </a:ln>
             <a:extLst>
               <a:ext uri="{C572A759-6A51-4108-AA02-DFA0A04FC94B}">
-                <ma14:wrappingTextBoxFlag xmlns:ma14="http://schemas.microsoft.com/office/mac/drawingml/2011/main" xmlns:a14="http://schemas.microsoft.com/office/drawing/2010/main" xmlns:m="http://schemas.openxmlformats.org/officeDocument/2006/math" xmlns="" val="1"/>
+                <ma14:wrappingTextBoxFlag xmlns="" xmlns:m="http://schemas.openxmlformats.org/officeDocument/2006/math" xmlns:a14="http://schemas.microsoft.com/office/drawing/2010/main" xmlns:ma14="http://schemas.microsoft.com/office/mac/drawingml/2011/main" val="1"/>
               </a:ext>
             </a:extLst>
           </p:spPr>
@@ -15421,7 +15469,7 @@
             <a:effectLst/>
             <a:extLst>
               <a:ext uri="{C572A759-6A51-4108-AA02-DFA0A04FC94B}">
-                <ma14:wrappingTextBoxFlag xmlns:ma14="http://schemas.microsoft.com/office/mac/drawingml/2011/main" xmlns:a14="http://schemas.microsoft.com/office/drawing/2010/main" xmlns:m="http://schemas.openxmlformats.org/officeDocument/2006/math" xmlns="" val="1"/>
+                <ma14:wrappingTextBoxFlag xmlns="" xmlns:m="http://schemas.openxmlformats.org/officeDocument/2006/math" xmlns:a14="http://schemas.microsoft.com/office/drawing/2010/main" xmlns:ma14="http://schemas.microsoft.com/office/mac/drawingml/2011/main" val="1"/>
               </a:ext>
             </a:extLst>
           </p:spPr>
@@ -15494,7 +15542,7 @@
             <a:effectLst/>
             <a:extLst>
               <a:ext uri="{C572A759-6A51-4108-AA02-DFA0A04FC94B}">
-                <ma14:wrappingTextBoxFlag xmlns:ma14="http://schemas.microsoft.com/office/mac/drawingml/2011/main" xmlns:a14="http://schemas.microsoft.com/office/drawing/2010/main" xmlns:m="http://schemas.openxmlformats.org/officeDocument/2006/math" xmlns="" val="1"/>
+                <ma14:wrappingTextBoxFlag xmlns="" xmlns:m="http://schemas.openxmlformats.org/officeDocument/2006/math" xmlns:a14="http://schemas.microsoft.com/office/drawing/2010/main" xmlns:ma14="http://schemas.microsoft.com/office/mac/drawingml/2011/main" val="1"/>
               </a:ext>
             </a:extLst>
           </p:spPr>
@@ -15560,7 +15608,7 @@
             </a:ln>
             <a:extLst>
               <a:ext uri="{C572A759-6A51-4108-AA02-DFA0A04FC94B}">
-                <ma14:wrappingTextBoxFlag xmlns:ma14="http://schemas.microsoft.com/office/mac/drawingml/2011/main" xmlns:a14="http://schemas.microsoft.com/office/drawing/2010/main" xmlns:m="http://schemas.openxmlformats.org/officeDocument/2006/math" xmlns="" val="1"/>
+                <ma14:wrappingTextBoxFlag xmlns="" xmlns:m="http://schemas.openxmlformats.org/officeDocument/2006/math" xmlns:a14="http://schemas.microsoft.com/office/drawing/2010/main" xmlns:ma14="http://schemas.microsoft.com/office/mac/drawingml/2011/main" val="1"/>
               </a:ext>
             </a:extLst>
           </p:spPr>
@@ -15618,7 +15666,7 @@
             </a:ln>
             <a:extLst>
               <a:ext uri="{C572A759-6A51-4108-AA02-DFA0A04FC94B}">
-                <ma14:wrappingTextBoxFlag xmlns:ma14="http://schemas.microsoft.com/office/mac/drawingml/2011/main" xmlns:a14="http://schemas.microsoft.com/office/drawing/2010/main" xmlns:m="http://schemas.openxmlformats.org/officeDocument/2006/math" xmlns="" val="1"/>
+                <ma14:wrappingTextBoxFlag xmlns="" xmlns:m="http://schemas.openxmlformats.org/officeDocument/2006/math" xmlns:a14="http://schemas.microsoft.com/office/drawing/2010/main" xmlns:ma14="http://schemas.microsoft.com/office/mac/drawingml/2011/main" val="1"/>
               </a:ext>
             </a:extLst>
           </p:spPr>
@@ -15699,7 +15747,7 @@
             <a:effectLst/>
             <a:extLst>
               <a:ext uri="{C572A759-6A51-4108-AA02-DFA0A04FC94B}">
-                <ma14:wrappingTextBoxFlag xmlns:ma14="http://schemas.microsoft.com/office/mac/drawingml/2011/main" xmlns:a14="http://schemas.microsoft.com/office/drawing/2010/main" xmlns:m="http://schemas.openxmlformats.org/officeDocument/2006/math" xmlns="" val="1"/>
+                <ma14:wrappingTextBoxFlag xmlns="" xmlns:m="http://schemas.openxmlformats.org/officeDocument/2006/math" xmlns:a14="http://schemas.microsoft.com/office/drawing/2010/main" xmlns:ma14="http://schemas.microsoft.com/office/mac/drawingml/2011/main" val="1"/>
               </a:ext>
             </a:extLst>
           </p:spPr>
@@ -15772,7 +15820,7 @@
             <a:effectLst/>
             <a:extLst>
               <a:ext uri="{C572A759-6A51-4108-AA02-DFA0A04FC94B}">
-                <ma14:wrappingTextBoxFlag xmlns:ma14="http://schemas.microsoft.com/office/mac/drawingml/2011/main" xmlns:a14="http://schemas.microsoft.com/office/drawing/2010/main" xmlns:m="http://schemas.openxmlformats.org/officeDocument/2006/math" xmlns="" val="1"/>
+                <ma14:wrappingTextBoxFlag xmlns="" xmlns:m="http://schemas.openxmlformats.org/officeDocument/2006/math" xmlns:a14="http://schemas.microsoft.com/office/drawing/2010/main" xmlns:ma14="http://schemas.microsoft.com/office/mac/drawingml/2011/main" val="1"/>
               </a:ext>
             </a:extLst>
           </p:spPr>
@@ -15838,7 +15886,7 @@
             </a:ln>
             <a:extLst>
               <a:ext uri="{C572A759-6A51-4108-AA02-DFA0A04FC94B}">
-                <ma14:wrappingTextBoxFlag xmlns:ma14="http://schemas.microsoft.com/office/mac/drawingml/2011/main" xmlns:a14="http://schemas.microsoft.com/office/drawing/2010/main" xmlns:m="http://schemas.openxmlformats.org/officeDocument/2006/math" xmlns="" val="1"/>
+                <ma14:wrappingTextBoxFlag xmlns="" xmlns:m="http://schemas.openxmlformats.org/officeDocument/2006/math" xmlns:a14="http://schemas.microsoft.com/office/drawing/2010/main" xmlns:ma14="http://schemas.microsoft.com/office/mac/drawingml/2011/main" val="1"/>
               </a:ext>
             </a:extLst>
           </p:spPr>
@@ -15896,7 +15944,7 @@
             </a:ln>
             <a:extLst>
               <a:ext uri="{C572A759-6A51-4108-AA02-DFA0A04FC94B}">
-                <ma14:wrappingTextBoxFlag xmlns:ma14="http://schemas.microsoft.com/office/mac/drawingml/2011/main" xmlns:a14="http://schemas.microsoft.com/office/drawing/2010/main" xmlns:m="http://schemas.openxmlformats.org/officeDocument/2006/math" xmlns="" val="1"/>
+                <ma14:wrappingTextBoxFlag xmlns="" xmlns:m="http://schemas.openxmlformats.org/officeDocument/2006/math" xmlns:a14="http://schemas.microsoft.com/office/drawing/2010/main" xmlns:ma14="http://schemas.microsoft.com/office/mac/drawingml/2011/main" val="1"/>
               </a:ext>
             </a:extLst>
           </p:spPr>
@@ -15977,7 +16025,7 @@
             <a:effectLst/>
             <a:extLst>
               <a:ext uri="{C572A759-6A51-4108-AA02-DFA0A04FC94B}">
-                <ma14:wrappingTextBoxFlag xmlns:ma14="http://schemas.microsoft.com/office/mac/drawingml/2011/main" xmlns:a14="http://schemas.microsoft.com/office/drawing/2010/main" xmlns:m="http://schemas.openxmlformats.org/officeDocument/2006/math" xmlns="" val="1"/>
+                <ma14:wrappingTextBoxFlag xmlns="" xmlns:m="http://schemas.openxmlformats.org/officeDocument/2006/math" xmlns:a14="http://schemas.microsoft.com/office/drawing/2010/main" xmlns:ma14="http://schemas.microsoft.com/office/mac/drawingml/2011/main" val="1"/>
               </a:ext>
             </a:extLst>
           </p:spPr>
@@ -16046,7 +16094,7 @@
             <a:effectLst/>
             <a:extLst>
               <a:ext uri="{C572A759-6A51-4108-AA02-DFA0A04FC94B}">
-                <ma14:wrappingTextBoxFlag xmlns:ma14="http://schemas.microsoft.com/office/mac/drawingml/2011/main" xmlns:a14="http://schemas.microsoft.com/office/drawing/2010/main" xmlns:m="http://schemas.openxmlformats.org/officeDocument/2006/math" xmlns="" val="1"/>
+                <ma14:wrappingTextBoxFlag xmlns="" xmlns:m="http://schemas.openxmlformats.org/officeDocument/2006/math" xmlns:a14="http://schemas.microsoft.com/office/drawing/2010/main" xmlns:ma14="http://schemas.microsoft.com/office/mac/drawingml/2011/main" val="1"/>
               </a:ext>
             </a:extLst>
           </p:spPr>
@@ -16112,7 +16160,7 @@
             </a:ln>
             <a:extLst>
               <a:ext uri="{C572A759-6A51-4108-AA02-DFA0A04FC94B}">
-                <ma14:wrappingTextBoxFlag xmlns:ma14="http://schemas.microsoft.com/office/mac/drawingml/2011/main" xmlns:a14="http://schemas.microsoft.com/office/drawing/2010/main" xmlns:m="http://schemas.openxmlformats.org/officeDocument/2006/math" xmlns="" val="1"/>
+                <ma14:wrappingTextBoxFlag xmlns="" xmlns:m="http://schemas.openxmlformats.org/officeDocument/2006/math" xmlns:a14="http://schemas.microsoft.com/office/drawing/2010/main" xmlns:ma14="http://schemas.microsoft.com/office/mac/drawingml/2011/main" val="1"/>
               </a:ext>
             </a:extLst>
           </p:spPr>
@@ -16170,7 +16218,7 @@
             </a:ln>
             <a:extLst>
               <a:ext uri="{C572A759-6A51-4108-AA02-DFA0A04FC94B}">
-                <ma14:wrappingTextBoxFlag xmlns:ma14="http://schemas.microsoft.com/office/mac/drawingml/2011/main" xmlns:a14="http://schemas.microsoft.com/office/drawing/2010/main" xmlns:m="http://schemas.openxmlformats.org/officeDocument/2006/math" xmlns="" val="1"/>
+                <ma14:wrappingTextBoxFlag xmlns="" xmlns:m="http://schemas.openxmlformats.org/officeDocument/2006/math" xmlns:a14="http://schemas.microsoft.com/office/drawing/2010/main" xmlns:ma14="http://schemas.microsoft.com/office/mac/drawingml/2011/main" val="1"/>
               </a:ext>
             </a:extLst>
           </p:spPr>
@@ -16251,7 +16299,7 @@
             <a:effectLst/>
             <a:extLst>
               <a:ext uri="{C572A759-6A51-4108-AA02-DFA0A04FC94B}">
-                <ma14:wrappingTextBoxFlag xmlns:ma14="http://schemas.microsoft.com/office/mac/drawingml/2011/main" xmlns:a14="http://schemas.microsoft.com/office/drawing/2010/main" xmlns:m="http://schemas.openxmlformats.org/officeDocument/2006/math" xmlns="" val="1"/>
+                <ma14:wrappingTextBoxFlag xmlns="" xmlns:m="http://schemas.openxmlformats.org/officeDocument/2006/math" xmlns:a14="http://schemas.microsoft.com/office/drawing/2010/main" xmlns:ma14="http://schemas.microsoft.com/office/mac/drawingml/2011/main" val="1"/>
               </a:ext>
             </a:extLst>
           </p:spPr>
@@ -16324,7 +16372,7 @@
             <a:effectLst/>
             <a:extLst>
               <a:ext uri="{C572A759-6A51-4108-AA02-DFA0A04FC94B}">
-                <ma14:wrappingTextBoxFlag xmlns:ma14="http://schemas.microsoft.com/office/mac/drawingml/2011/main" xmlns:a14="http://schemas.microsoft.com/office/drawing/2010/main" xmlns:m="http://schemas.openxmlformats.org/officeDocument/2006/math" xmlns="" val="1"/>
+                <ma14:wrappingTextBoxFlag xmlns="" xmlns:m="http://schemas.openxmlformats.org/officeDocument/2006/math" xmlns:a14="http://schemas.microsoft.com/office/drawing/2010/main" xmlns:ma14="http://schemas.microsoft.com/office/mac/drawingml/2011/main" val="1"/>
               </a:ext>
             </a:extLst>
           </p:spPr>
@@ -16390,7 +16438,7 @@
             </a:ln>
             <a:extLst>
               <a:ext uri="{C572A759-6A51-4108-AA02-DFA0A04FC94B}">
-                <ma14:wrappingTextBoxFlag xmlns:ma14="http://schemas.microsoft.com/office/mac/drawingml/2011/main" xmlns:a14="http://schemas.microsoft.com/office/drawing/2010/main" xmlns:m="http://schemas.openxmlformats.org/officeDocument/2006/math" xmlns="" val="1"/>
+                <ma14:wrappingTextBoxFlag xmlns="" xmlns:m="http://schemas.openxmlformats.org/officeDocument/2006/math" xmlns:a14="http://schemas.microsoft.com/office/drawing/2010/main" xmlns:ma14="http://schemas.microsoft.com/office/mac/drawingml/2011/main" val="1"/>
               </a:ext>
             </a:extLst>
           </p:spPr>
@@ -16448,7 +16496,7 @@
             </a:ln>
             <a:extLst>
               <a:ext uri="{C572A759-6A51-4108-AA02-DFA0A04FC94B}">
-                <ma14:wrappingTextBoxFlag xmlns:ma14="http://schemas.microsoft.com/office/mac/drawingml/2011/main" xmlns:a14="http://schemas.microsoft.com/office/drawing/2010/main" xmlns:m="http://schemas.openxmlformats.org/officeDocument/2006/math" xmlns="" val="1"/>
+                <ma14:wrappingTextBoxFlag xmlns="" xmlns:m="http://schemas.openxmlformats.org/officeDocument/2006/math" xmlns:a14="http://schemas.microsoft.com/office/drawing/2010/main" xmlns:ma14="http://schemas.microsoft.com/office/mac/drawingml/2011/main" val="1"/>
               </a:ext>
             </a:extLst>
           </p:spPr>
@@ -16529,7 +16577,7 @@
             <a:effectLst/>
             <a:extLst>
               <a:ext uri="{C572A759-6A51-4108-AA02-DFA0A04FC94B}">
-                <ma14:wrappingTextBoxFlag xmlns:ma14="http://schemas.microsoft.com/office/mac/drawingml/2011/main" xmlns:a14="http://schemas.microsoft.com/office/drawing/2010/main" xmlns:m="http://schemas.openxmlformats.org/officeDocument/2006/math" xmlns="" val="1"/>
+                <ma14:wrappingTextBoxFlag xmlns="" xmlns:m="http://schemas.openxmlformats.org/officeDocument/2006/math" xmlns:a14="http://schemas.microsoft.com/office/drawing/2010/main" xmlns:ma14="http://schemas.microsoft.com/office/mac/drawingml/2011/main" val="1"/>
               </a:ext>
             </a:extLst>
           </p:spPr>
@@ -16602,7 +16650,7 @@
             <a:effectLst/>
             <a:extLst>
               <a:ext uri="{C572A759-6A51-4108-AA02-DFA0A04FC94B}">
-                <ma14:wrappingTextBoxFlag xmlns:ma14="http://schemas.microsoft.com/office/mac/drawingml/2011/main" xmlns:a14="http://schemas.microsoft.com/office/drawing/2010/main" xmlns:m="http://schemas.openxmlformats.org/officeDocument/2006/math" xmlns="" val="1"/>
+                <ma14:wrappingTextBoxFlag xmlns="" xmlns:m="http://schemas.openxmlformats.org/officeDocument/2006/math" xmlns:a14="http://schemas.microsoft.com/office/drawing/2010/main" xmlns:ma14="http://schemas.microsoft.com/office/mac/drawingml/2011/main" val="1"/>
               </a:ext>
             </a:extLst>
           </p:spPr>
@@ -16668,7 +16716,7 @@
             </a:ln>
             <a:extLst>
               <a:ext uri="{C572A759-6A51-4108-AA02-DFA0A04FC94B}">
-                <ma14:wrappingTextBoxFlag xmlns:ma14="http://schemas.microsoft.com/office/mac/drawingml/2011/main" xmlns:a14="http://schemas.microsoft.com/office/drawing/2010/main" xmlns:m="http://schemas.openxmlformats.org/officeDocument/2006/math" xmlns="" val="1"/>
+                <ma14:wrappingTextBoxFlag xmlns="" xmlns:m="http://schemas.openxmlformats.org/officeDocument/2006/math" xmlns:a14="http://schemas.microsoft.com/office/drawing/2010/main" xmlns:ma14="http://schemas.microsoft.com/office/mac/drawingml/2011/main" val="1"/>
               </a:ext>
             </a:extLst>
           </p:spPr>
@@ -16726,7 +16774,7 @@
             </a:ln>
             <a:extLst>
               <a:ext uri="{C572A759-6A51-4108-AA02-DFA0A04FC94B}">
-                <ma14:wrappingTextBoxFlag xmlns:ma14="http://schemas.microsoft.com/office/mac/drawingml/2011/main" xmlns:a14="http://schemas.microsoft.com/office/drawing/2010/main" xmlns:m="http://schemas.openxmlformats.org/officeDocument/2006/math" xmlns="" val="1"/>
+                <ma14:wrappingTextBoxFlag xmlns="" xmlns:m="http://schemas.openxmlformats.org/officeDocument/2006/math" xmlns:a14="http://schemas.microsoft.com/office/drawing/2010/main" xmlns:ma14="http://schemas.microsoft.com/office/mac/drawingml/2011/main" val="1"/>
               </a:ext>
             </a:extLst>
           </p:spPr>
@@ -16785,7 +16833,7 @@
           </a:ln>
           <a:extLst>
             <a:ext uri="{C572A759-6A51-4108-AA02-DFA0A04FC94B}">
-              <ma14:wrappingTextBoxFlag xmlns:ma14="http://schemas.microsoft.com/office/mac/drawingml/2011/main" xmlns:a14="http://schemas.microsoft.com/office/drawing/2010/main" xmlns:m="http://schemas.openxmlformats.org/officeDocument/2006/math" xmlns="" val="1"/>
+              <ma14:wrappingTextBoxFlag xmlns="" xmlns:m="http://schemas.openxmlformats.org/officeDocument/2006/math" xmlns:a14="http://schemas.microsoft.com/office/drawing/2010/main" xmlns:ma14="http://schemas.microsoft.com/office/mac/drawingml/2011/main" val="1"/>
             </a:ext>
           </a:extLst>
         </p:spPr>
@@ -16843,7 +16891,7 @@
           </a:ln>
           <a:extLst>
             <a:ext uri="{C572A759-6A51-4108-AA02-DFA0A04FC94B}">
-              <ma14:wrappingTextBoxFlag xmlns:ma14="http://schemas.microsoft.com/office/mac/drawingml/2011/main" xmlns:a14="http://schemas.microsoft.com/office/drawing/2010/main" xmlns:m="http://schemas.openxmlformats.org/officeDocument/2006/math" xmlns="" val="1"/>
+              <ma14:wrappingTextBoxFlag xmlns="" xmlns:m="http://schemas.openxmlformats.org/officeDocument/2006/math" xmlns:a14="http://schemas.microsoft.com/office/drawing/2010/main" xmlns:ma14="http://schemas.microsoft.com/office/mac/drawingml/2011/main" val="1"/>
             </a:ext>
           </a:extLst>
         </p:spPr>
@@ -17087,7 +17135,7 @@
             </a:ln>
             <a:extLst>
               <a:ext uri="{C572A759-6A51-4108-AA02-DFA0A04FC94B}">
-                <ma14:wrappingTextBoxFlag xmlns:ma14="http://schemas.microsoft.com/office/mac/drawingml/2011/main" xmlns:a14="http://schemas.microsoft.com/office/drawing/2010/main" xmlns:m="http://schemas.openxmlformats.org/officeDocument/2006/math" xmlns="" val="1"/>
+                <ma14:wrappingTextBoxFlag xmlns="" xmlns:m="http://schemas.openxmlformats.org/officeDocument/2006/math" xmlns:a14="http://schemas.microsoft.com/office/drawing/2010/main" xmlns:ma14="http://schemas.microsoft.com/office/mac/drawingml/2011/main" val="1"/>
               </a:ext>
             </a:extLst>
           </p:spPr>
@@ -17639,7 +17687,7 @@
             </a:ln>
             <a:extLst>
               <a:ext uri="{C572A759-6A51-4108-AA02-DFA0A04FC94B}">
-                <ma14:wrappingTextBoxFlag xmlns:ma14="http://schemas.microsoft.com/office/mac/drawingml/2011/main" xmlns:a14="http://schemas.microsoft.com/office/drawing/2010/main" xmlns:m="http://schemas.openxmlformats.org/officeDocument/2006/math" xmlns="" val="1"/>
+                <ma14:wrappingTextBoxFlag xmlns="" xmlns:m="http://schemas.openxmlformats.org/officeDocument/2006/math" xmlns:a14="http://schemas.microsoft.com/office/drawing/2010/main" xmlns:ma14="http://schemas.microsoft.com/office/mac/drawingml/2011/main" val="1"/>
               </a:ext>
             </a:extLst>
           </p:spPr>
@@ -18862,7 +18910,7 @@
           </a:prstGeom>
           <a:extLst>
             <a:ext uri="{C572A759-6A51-4108-AA02-DFA0A04FC94B}">
-              <ma14:wrappingTextBoxFlag xmlns:ma14="http://schemas.microsoft.com/office/mac/drawingml/2011/main" xmlns:a14="http://schemas.microsoft.com/office/drawing/2010/main" xmlns:m="http://schemas.openxmlformats.org/officeDocument/2006/math" xmlns="" val="1"/>
+              <ma14:wrappingTextBoxFlag xmlns="" xmlns:m="http://schemas.openxmlformats.org/officeDocument/2006/math" xmlns:a14="http://schemas.microsoft.com/office/drawing/2010/main" xmlns:ma14="http://schemas.microsoft.com/office/mac/drawingml/2011/main" val="1"/>
             </a:ext>
           </a:extLst>
         </p:spPr>
@@ -19609,7 +19657,7 @@
             <a:effectLst/>
             <a:extLst>
               <a:ext uri="{C572A759-6A51-4108-AA02-DFA0A04FC94B}">
-                <ma14:wrappingTextBoxFlag xmlns="" xmlns:m="http://schemas.openxmlformats.org/officeDocument/2006/math" xmlns:a14="http://schemas.microsoft.com/office/drawing/2010/main" xmlns:ma14="http://schemas.microsoft.com/office/mac/drawingml/2011/main" val="1"/>
+                <ma14:wrappingTextBoxFlag xmlns:ma14="http://schemas.microsoft.com/office/mac/drawingml/2011/main" xmlns:a14="http://schemas.microsoft.com/office/drawing/2010/main" xmlns:m="http://schemas.openxmlformats.org/officeDocument/2006/math" xmlns="" val="1"/>
               </a:ext>
             </a:extLst>
           </p:spPr>
@@ -19892,7 +19940,7 @@
             <a:effectLst/>
             <a:extLst>
               <a:ext uri="{C572A759-6A51-4108-AA02-DFA0A04FC94B}">
-                <ma14:wrappingTextBoxFlag xmlns="" xmlns:m="http://schemas.openxmlformats.org/officeDocument/2006/math" xmlns:a14="http://schemas.microsoft.com/office/drawing/2010/main" xmlns:ma14="http://schemas.microsoft.com/office/mac/drawingml/2011/main" val="1"/>
+                <ma14:wrappingTextBoxFlag xmlns:ma14="http://schemas.microsoft.com/office/mac/drawingml/2011/main" xmlns:a14="http://schemas.microsoft.com/office/drawing/2010/main" xmlns:m="http://schemas.openxmlformats.org/officeDocument/2006/math" xmlns="" val="1"/>
               </a:ext>
             </a:extLst>
           </p:spPr>
@@ -21026,7 +21074,7 @@
             <a:effectLst/>
             <a:extLst>
               <a:ext uri="{C572A759-6A51-4108-AA02-DFA0A04FC94B}">
-                <ma14:wrappingTextBoxFlag xmlns:ma14="http://schemas.microsoft.com/office/mac/drawingml/2011/main" xmlns:a14="http://schemas.microsoft.com/office/drawing/2010/main" xmlns:m="http://schemas.openxmlformats.org/officeDocument/2006/math" xmlns="" val="1"/>
+                <ma14:wrappingTextBoxFlag xmlns="" xmlns:m="http://schemas.openxmlformats.org/officeDocument/2006/math" xmlns:a14="http://schemas.microsoft.com/office/drawing/2010/main" xmlns:ma14="http://schemas.microsoft.com/office/mac/drawingml/2011/main" val="1"/>
               </a:ext>
             </a:extLst>
           </p:spPr>
@@ -21291,7 +21339,7 @@
             <a:effectLst/>
             <a:extLst>
               <a:ext uri="{C572A759-6A51-4108-AA02-DFA0A04FC94B}">
-                <ma14:wrappingTextBoxFlag xmlns:ma14="http://schemas.microsoft.com/office/mac/drawingml/2011/main" xmlns:a14="http://schemas.microsoft.com/office/drawing/2010/main" xmlns:m="http://schemas.openxmlformats.org/officeDocument/2006/math" xmlns="" val="1"/>
+                <ma14:wrappingTextBoxFlag xmlns="" xmlns:m="http://schemas.openxmlformats.org/officeDocument/2006/math" xmlns:a14="http://schemas.microsoft.com/office/drawing/2010/main" xmlns:ma14="http://schemas.microsoft.com/office/mac/drawingml/2011/main" val="1"/>
               </a:ext>
             </a:extLst>
           </p:spPr>
@@ -22881,7 +22929,7 @@
             <a:effectLst/>
             <a:extLst>
               <a:ext uri="{C572A759-6A51-4108-AA02-DFA0A04FC94B}">
-                <ma14:wrappingTextBoxFlag xmlns="" xmlns:m="http://schemas.openxmlformats.org/officeDocument/2006/math" xmlns:a14="http://schemas.microsoft.com/office/drawing/2010/main" xmlns:ma14="http://schemas.microsoft.com/office/mac/drawingml/2011/main" val="1"/>
+                <ma14:wrappingTextBoxFlag xmlns:ma14="http://schemas.microsoft.com/office/mac/drawingml/2011/main" xmlns:a14="http://schemas.microsoft.com/office/drawing/2010/main" xmlns:m="http://schemas.openxmlformats.org/officeDocument/2006/math" xmlns="" val="1"/>
               </a:ext>
             </a:extLst>
           </p:spPr>
@@ -27197,7 +27245,7 @@
             <a:effectLst/>
             <a:extLst>
               <a:ext uri="{C572A759-6A51-4108-AA02-DFA0A04FC94B}">
-                <ma14:wrappingTextBoxFlag xmlns="" xmlns:m="http://schemas.openxmlformats.org/officeDocument/2006/math" xmlns:a14="http://schemas.microsoft.com/office/drawing/2010/main" xmlns:ma14="http://schemas.microsoft.com/office/mac/drawingml/2011/main" val="1"/>
+                <ma14:wrappingTextBoxFlag xmlns:ma14="http://schemas.microsoft.com/office/mac/drawingml/2011/main" xmlns:a14="http://schemas.microsoft.com/office/drawing/2010/main" xmlns:m="http://schemas.openxmlformats.org/officeDocument/2006/math" xmlns="" val="1"/>
               </a:ext>
             </a:extLst>
           </p:spPr>
@@ -27500,7 +27548,7 @@
           </a:prstGeom>
           <a:extLst>
             <a:ext uri="{C572A759-6A51-4108-AA02-DFA0A04FC94B}">
-              <ma14:wrappingTextBoxFlag xmlns="" xmlns:m="http://schemas.openxmlformats.org/officeDocument/2006/math" xmlns:a14="http://schemas.microsoft.com/office/drawing/2010/main" xmlns:ma14="http://schemas.microsoft.com/office/mac/drawingml/2011/main" val="1"/>
+              <ma14:wrappingTextBoxFlag xmlns:ma14="http://schemas.microsoft.com/office/mac/drawingml/2011/main" xmlns:a14="http://schemas.microsoft.com/office/drawing/2010/main" xmlns:m="http://schemas.openxmlformats.org/officeDocument/2006/math" xmlns="" val="1"/>
             </a:ext>
           </a:extLst>
         </p:spPr>
@@ -27538,7 +27586,7 @@
           </a:ln>
           <a:extLst>
             <a:ext uri="{C572A759-6A51-4108-AA02-DFA0A04FC94B}">
-              <ma14:wrappingTextBoxFlag xmlns="" xmlns:m="http://schemas.openxmlformats.org/officeDocument/2006/math" xmlns:a14="http://schemas.microsoft.com/office/drawing/2010/main" xmlns:ma14="http://schemas.microsoft.com/office/mac/drawingml/2011/main" val="1"/>
+              <ma14:wrappingTextBoxFlag xmlns:ma14="http://schemas.microsoft.com/office/mac/drawingml/2011/main" xmlns:a14="http://schemas.microsoft.com/office/drawing/2010/main" xmlns:m="http://schemas.openxmlformats.org/officeDocument/2006/math" xmlns="" val="1"/>
             </a:ext>
           </a:extLst>
         </p:spPr>
@@ -28605,7 +28653,7 @@
           </a:ln>
           <a:extLst>
             <a:ext uri="{C572A759-6A51-4108-AA02-DFA0A04FC94B}">
-              <ma14:wrappingTextBoxFlag xmlns="" xmlns:m="http://schemas.openxmlformats.org/officeDocument/2006/math" xmlns:a14="http://schemas.microsoft.com/office/drawing/2010/main" xmlns:ma14="http://schemas.microsoft.com/office/mac/drawingml/2011/main" val="1"/>
+              <ma14:wrappingTextBoxFlag xmlns:ma14="http://schemas.microsoft.com/office/mac/drawingml/2011/main" xmlns:a14="http://schemas.microsoft.com/office/drawing/2010/main" xmlns:m="http://schemas.openxmlformats.org/officeDocument/2006/math" xmlns="" val="1"/>
             </a:ext>
           </a:extLst>
         </p:spPr>
@@ -29637,7 +29685,7 @@
           </a:ln>
           <a:extLst>
             <a:ext uri="{C572A759-6A51-4108-AA02-DFA0A04FC94B}">
-              <ma14:wrappingTextBoxFlag xmlns="" xmlns:m="http://schemas.openxmlformats.org/officeDocument/2006/math" xmlns:a14="http://schemas.microsoft.com/office/drawing/2010/main" xmlns:ma14="http://schemas.microsoft.com/office/mac/drawingml/2011/main" val="1"/>
+              <ma14:wrappingTextBoxFlag xmlns:ma14="http://schemas.microsoft.com/office/mac/drawingml/2011/main" xmlns:a14="http://schemas.microsoft.com/office/drawing/2010/main" xmlns:m="http://schemas.openxmlformats.org/officeDocument/2006/math" xmlns="" val="1"/>
             </a:ext>
           </a:extLst>
         </p:spPr>
@@ -29695,7 +29743,7 @@
           </a:ln>
           <a:extLst>
             <a:ext uri="{C572A759-6A51-4108-AA02-DFA0A04FC94B}">
-              <ma14:wrappingTextBoxFlag xmlns="" xmlns:m="http://schemas.openxmlformats.org/officeDocument/2006/math" xmlns:a14="http://schemas.microsoft.com/office/drawing/2010/main" xmlns:ma14="http://schemas.microsoft.com/office/mac/drawingml/2011/main" val="1"/>
+              <ma14:wrappingTextBoxFlag xmlns:ma14="http://schemas.microsoft.com/office/mac/drawingml/2011/main" xmlns:a14="http://schemas.microsoft.com/office/drawing/2010/main" xmlns:m="http://schemas.openxmlformats.org/officeDocument/2006/math" xmlns="" val="1"/>
             </a:ext>
           </a:extLst>
         </p:spPr>
@@ -29739,7 +29787,7 @@
           </a:ln>
           <a:extLst>
             <a:ext uri="{C572A759-6A51-4108-AA02-DFA0A04FC94B}">
-              <ma14:wrappingTextBoxFlag xmlns="" xmlns:m="http://schemas.openxmlformats.org/officeDocument/2006/math" xmlns:a14="http://schemas.microsoft.com/office/drawing/2010/main" xmlns:ma14="http://schemas.microsoft.com/office/mac/drawingml/2011/main" val="1"/>
+              <ma14:wrappingTextBoxFlag xmlns:ma14="http://schemas.microsoft.com/office/mac/drawingml/2011/main" xmlns:a14="http://schemas.microsoft.com/office/drawing/2010/main" xmlns:m="http://schemas.openxmlformats.org/officeDocument/2006/math" xmlns="" val="1"/>
             </a:ext>
           </a:extLst>
         </p:spPr>
@@ -29775,7 +29823,7 @@
           </a:ln>
           <a:extLst>
             <a:ext uri="{C572A759-6A51-4108-AA02-DFA0A04FC94B}">
-              <ma14:wrappingTextBoxFlag xmlns="" xmlns:m="http://schemas.openxmlformats.org/officeDocument/2006/math" xmlns:a14="http://schemas.microsoft.com/office/drawing/2010/main" xmlns:ma14="http://schemas.microsoft.com/office/mac/drawingml/2011/main" val="1"/>
+              <ma14:wrappingTextBoxFlag xmlns:ma14="http://schemas.microsoft.com/office/mac/drawingml/2011/main" xmlns:a14="http://schemas.microsoft.com/office/drawing/2010/main" xmlns:m="http://schemas.openxmlformats.org/officeDocument/2006/math" xmlns="" val="1"/>
             </a:ext>
           </a:extLst>
         </p:spPr>
@@ -29863,7 +29911,7 @@
             <a:effectLst/>
             <a:extLst>
               <a:ext uri="{C572A759-6A51-4108-AA02-DFA0A04FC94B}">
-                <ma14:wrappingTextBoxFlag xmlns="" xmlns:m="http://schemas.openxmlformats.org/officeDocument/2006/math" xmlns:a14="http://schemas.microsoft.com/office/drawing/2010/main" xmlns:ma14="http://schemas.microsoft.com/office/mac/drawingml/2011/main" val="1"/>
+                <ma14:wrappingTextBoxFlag xmlns:ma14="http://schemas.microsoft.com/office/mac/drawingml/2011/main" xmlns:a14="http://schemas.microsoft.com/office/drawing/2010/main" xmlns:m="http://schemas.openxmlformats.org/officeDocument/2006/math" xmlns="" val="1"/>
               </a:ext>
             </a:extLst>
           </p:spPr>
@@ -30125,7 +30173,7 @@
             <a:effectLst/>
             <a:extLst>
               <a:ext uri="{C572A759-6A51-4108-AA02-DFA0A04FC94B}">
-                <ma14:wrappingTextBoxFlag xmlns="" xmlns:m="http://schemas.openxmlformats.org/officeDocument/2006/math" xmlns:a14="http://schemas.microsoft.com/office/drawing/2010/main" xmlns:ma14="http://schemas.microsoft.com/office/mac/drawingml/2011/main" val="1"/>
+                <ma14:wrappingTextBoxFlag xmlns:ma14="http://schemas.microsoft.com/office/mac/drawingml/2011/main" xmlns:a14="http://schemas.microsoft.com/office/drawing/2010/main" xmlns:m="http://schemas.openxmlformats.org/officeDocument/2006/math" xmlns="" val="1"/>
               </a:ext>
             </a:extLst>
           </p:spPr>
@@ -31856,7 +31904,7 @@
           </a:prstGeom>
           <a:extLst>
             <a:ext uri="{C572A759-6A51-4108-AA02-DFA0A04FC94B}">
-              <ma14:wrappingTextBoxFlag xmlns="" xmlns:m="http://schemas.openxmlformats.org/officeDocument/2006/math" xmlns:a14="http://schemas.microsoft.com/office/drawing/2010/main" xmlns:ma14="http://schemas.microsoft.com/office/mac/drawingml/2011/main" val="1"/>
+              <ma14:wrappingTextBoxFlag xmlns:ma14="http://schemas.microsoft.com/office/mac/drawingml/2011/main" xmlns:a14="http://schemas.microsoft.com/office/drawing/2010/main" xmlns:m="http://schemas.openxmlformats.org/officeDocument/2006/math" xmlns="" val="1"/>
             </a:ext>
           </a:extLst>
         </p:spPr>
@@ -32246,7 +32294,7 @@
               </a:effectLst>
               <a:extLst>
                 <a:ext uri="{C572A759-6A51-4108-AA02-DFA0A04FC94B}">
-                  <ma14:wrappingTextBoxFlag xmlns="" xmlns:m="http://schemas.openxmlformats.org/officeDocument/2006/math" xmlns:a14="http://schemas.microsoft.com/office/drawing/2010/main" xmlns:ma14="http://schemas.microsoft.com/office/mac/drawingml/2011/main" val="1"/>
+                  <ma14:wrappingTextBoxFlag xmlns:ma14="http://schemas.microsoft.com/office/mac/drawingml/2011/main" xmlns:a14="http://schemas.microsoft.com/office/drawing/2010/main" xmlns:m="http://schemas.openxmlformats.org/officeDocument/2006/math" xmlns="" val="1"/>
                 </a:ext>
               </a:extLst>
             </p:spPr>
@@ -32316,7 +32364,7 @@
               </a:effectLst>
               <a:extLst>
                 <a:ext uri="{C572A759-6A51-4108-AA02-DFA0A04FC94B}">
-                  <ma14:wrappingTextBoxFlag xmlns="" xmlns:m="http://schemas.openxmlformats.org/officeDocument/2006/math" xmlns:a14="http://schemas.microsoft.com/office/drawing/2010/main" xmlns:ma14="http://schemas.microsoft.com/office/mac/drawingml/2011/main" val="1"/>
+                  <ma14:wrappingTextBoxFlag xmlns:ma14="http://schemas.microsoft.com/office/mac/drawingml/2011/main" xmlns:a14="http://schemas.microsoft.com/office/drawing/2010/main" xmlns:m="http://schemas.openxmlformats.org/officeDocument/2006/math" xmlns="" val="1"/>
                 </a:ext>
               </a:extLst>
             </p:spPr>
@@ -32384,7 +32432,7 @@
               </a:effectLst>
               <a:extLst>
                 <a:ext uri="{C572A759-6A51-4108-AA02-DFA0A04FC94B}">
-                  <ma14:wrappingTextBoxFlag xmlns="" xmlns:m="http://schemas.openxmlformats.org/officeDocument/2006/math" xmlns:a14="http://schemas.microsoft.com/office/drawing/2010/main" xmlns:ma14="http://schemas.microsoft.com/office/mac/drawingml/2011/main" val="1"/>
+                  <ma14:wrappingTextBoxFlag xmlns:ma14="http://schemas.microsoft.com/office/mac/drawingml/2011/main" xmlns:a14="http://schemas.microsoft.com/office/drawing/2010/main" xmlns:m="http://schemas.openxmlformats.org/officeDocument/2006/math" xmlns="" val="1"/>
                 </a:ext>
               </a:extLst>
             </p:spPr>
@@ -32472,7 +32520,7 @@
                 </a:effectLst>
                 <a:extLst>
                   <a:ext uri="{C572A759-6A51-4108-AA02-DFA0A04FC94B}">
-                    <ma14:wrappingTextBoxFlag xmlns="" xmlns:m="http://schemas.openxmlformats.org/officeDocument/2006/math" xmlns:a14="http://schemas.microsoft.com/office/drawing/2010/main" xmlns:ma14="http://schemas.microsoft.com/office/mac/drawingml/2011/main" val="1"/>
+                    <ma14:wrappingTextBoxFlag xmlns:ma14="http://schemas.microsoft.com/office/mac/drawingml/2011/main" xmlns:a14="http://schemas.microsoft.com/office/drawing/2010/main" xmlns:m="http://schemas.openxmlformats.org/officeDocument/2006/math" xmlns="" val="1"/>
                   </a:ext>
                 </a:extLst>
               </p:spPr>
@@ -32650,7 +32698,7 @@
                   <a:effectLst/>
                   <a:extLst>
                     <a:ext uri="{C572A759-6A51-4108-AA02-DFA0A04FC94B}">
-                      <ma14:wrappingTextBoxFlag xmlns="" xmlns:m="http://schemas.openxmlformats.org/officeDocument/2006/math" xmlns:a14="http://schemas.microsoft.com/office/drawing/2010/main" xmlns:ma14="http://schemas.microsoft.com/office/mac/drawingml/2011/main" val="1"/>
+                      <ma14:wrappingTextBoxFlag xmlns:ma14="http://schemas.microsoft.com/office/mac/drawingml/2011/main" xmlns:a14="http://schemas.microsoft.com/office/drawing/2010/main" xmlns:m="http://schemas.openxmlformats.org/officeDocument/2006/math" xmlns="" val="1"/>
                     </a:ext>
                   </a:extLst>
                 </p:spPr>
@@ -32850,7 +32898,7 @@
                   <a:effectLst/>
                   <a:extLst>
                     <a:ext uri="{C572A759-6A51-4108-AA02-DFA0A04FC94B}">
-                      <ma14:wrappingTextBoxFlag xmlns="" xmlns:m="http://schemas.openxmlformats.org/officeDocument/2006/math" xmlns:a14="http://schemas.microsoft.com/office/drawing/2010/main" xmlns:ma14="http://schemas.microsoft.com/office/mac/drawingml/2011/main" val="1"/>
+                      <ma14:wrappingTextBoxFlag xmlns:ma14="http://schemas.microsoft.com/office/mac/drawingml/2011/main" xmlns:a14="http://schemas.microsoft.com/office/drawing/2010/main" xmlns:m="http://schemas.openxmlformats.org/officeDocument/2006/math" xmlns="" val="1"/>
                     </a:ext>
                   </a:extLst>
                 </p:spPr>
@@ -32940,7 +32988,7 @@
                 </a:effectLst>
                 <a:extLst>
                   <a:ext uri="{C572A759-6A51-4108-AA02-DFA0A04FC94B}">
-                    <ma14:wrappingTextBoxFlag xmlns="" xmlns:m="http://schemas.openxmlformats.org/officeDocument/2006/math" xmlns:a14="http://schemas.microsoft.com/office/drawing/2010/main" xmlns:ma14="http://schemas.microsoft.com/office/mac/drawingml/2011/main" val="1"/>
+                    <ma14:wrappingTextBoxFlag xmlns:ma14="http://schemas.microsoft.com/office/mac/drawingml/2011/main" xmlns:a14="http://schemas.microsoft.com/office/drawing/2010/main" xmlns:m="http://schemas.openxmlformats.org/officeDocument/2006/math" xmlns="" val="1"/>
                   </a:ext>
                 </a:extLst>
               </p:spPr>
@@ -33118,7 +33166,7 @@
                   <a:effectLst/>
                   <a:extLst>
                     <a:ext uri="{C572A759-6A51-4108-AA02-DFA0A04FC94B}">
-                      <ma14:wrappingTextBoxFlag xmlns="" xmlns:m="http://schemas.openxmlformats.org/officeDocument/2006/math" xmlns:a14="http://schemas.microsoft.com/office/drawing/2010/main" xmlns:ma14="http://schemas.microsoft.com/office/mac/drawingml/2011/main" val="1"/>
+                      <ma14:wrappingTextBoxFlag xmlns:ma14="http://schemas.microsoft.com/office/mac/drawingml/2011/main" xmlns:a14="http://schemas.microsoft.com/office/drawing/2010/main" xmlns:m="http://schemas.openxmlformats.org/officeDocument/2006/math" xmlns="" val="1"/>
                     </a:ext>
                   </a:extLst>
                 </p:spPr>
@@ -33208,7 +33256,7 @@
                 </a:effectLst>
                 <a:extLst>
                   <a:ext uri="{C572A759-6A51-4108-AA02-DFA0A04FC94B}">
-                    <ma14:wrappingTextBoxFlag xmlns="" xmlns:m="http://schemas.openxmlformats.org/officeDocument/2006/math" xmlns:a14="http://schemas.microsoft.com/office/drawing/2010/main" xmlns:ma14="http://schemas.microsoft.com/office/mac/drawingml/2011/main" val="1"/>
+                    <ma14:wrappingTextBoxFlag xmlns:ma14="http://schemas.microsoft.com/office/mac/drawingml/2011/main" xmlns:a14="http://schemas.microsoft.com/office/drawing/2010/main" xmlns:m="http://schemas.openxmlformats.org/officeDocument/2006/math" xmlns="" val="1"/>
                   </a:ext>
                 </a:extLst>
               </p:spPr>
@@ -33386,7 +33434,7 @@
                   <a:effectLst/>
                   <a:extLst>
                     <a:ext uri="{C572A759-6A51-4108-AA02-DFA0A04FC94B}">
-                      <ma14:wrappingTextBoxFlag xmlns="" xmlns:m="http://schemas.openxmlformats.org/officeDocument/2006/math" xmlns:a14="http://schemas.microsoft.com/office/drawing/2010/main" xmlns:ma14="http://schemas.microsoft.com/office/mac/drawingml/2011/main" val="1"/>
+                      <ma14:wrappingTextBoxFlag xmlns:ma14="http://schemas.microsoft.com/office/mac/drawingml/2011/main" xmlns:a14="http://schemas.microsoft.com/office/drawing/2010/main" xmlns:m="http://schemas.openxmlformats.org/officeDocument/2006/math" xmlns="" val="1"/>
                     </a:ext>
                   </a:extLst>
                 </p:spPr>
@@ -33457,7 +33505,7 @@
             </a:effectLst>
             <a:extLst>
               <a:ext uri="{C572A759-6A51-4108-AA02-DFA0A04FC94B}">
-                <ma14:wrappingTextBoxFlag xmlns="" xmlns:m="http://schemas.openxmlformats.org/officeDocument/2006/math" xmlns:a14="http://schemas.microsoft.com/office/drawing/2010/main" xmlns:ma14="http://schemas.microsoft.com/office/mac/drawingml/2011/main" val="1"/>
+                <ma14:wrappingTextBoxFlag xmlns:ma14="http://schemas.microsoft.com/office/mac/drawingml/2011/main" xmlns:a14="http://schemas.microsoft.com/office/drawing/2010/main" xmlns:m="http://schemas.openxmlformats.org/officeDocument/2006/math" xmlns="" val="1"/>
               </a:ext>
             </a:extLst>
           </p:spPr>
@@ -33684,7 +33732,7 @@
           </a:prstGeom>
           <a:extLst>
             <a:ext uri="{C572A759-6A51-4108-AA02-DFA0A04FC94B}">
-              <ma14:wrappingTextBoxFlag xmlns="" xmlns:m="http://schemas.openxmlformats.org/officeDocument/2006/math" xmlns:a14="http://schemas.microsoft.com/office/drawing/2010/main" xmlns:ma14="http://schemas.microsoft.com/office/mac/drawingml/2011/main" val="1"/>
+              <ma14:wrappingTextBoxFlag xmlns:ma14="http://schemas.microsoft.com/office/mac/drawingml/2011/main" xmlns:a14="http://schemas.microsoft.com/office/drawing/2010/main" xmlns:m="http://schemas.openxmlformats.org/officeDocument/2006/math" xmlns="" val="1"/>
             </a:ext>
           </a:extLst>
         </p:spPr>
@@ -34622,7 +34670,7 @@
           </a:ln>
           <a:extLst>
             <a:ext uri="{C572A759-6A51-4108-AA02-DFA0A04FC94B}">
-              <ma14:wrappingTextBoxFlag xmlns:ma14="http://schemas.microsoft.com/office/mac/drawingml/2011/main" xmlns:a14="http://schemas.microsoft.com/office/drawing/2010/main" xmlns:m="http://schemas.openxmlformats.org/officeDocument/2006/math" xmlns="" val="1"/>
+              <ma14:wrappingTextBoxFlag xmlns="" xmlns:m="http://schemas.openxmlformats.org/officeDocument/2006/math" xmlns:a14="http://schemas.microsoft.com/office/drawing/2010/main" xmlns:ma14="http://schemas.microsoft.com/office/mac/drawingml/2011/main" val="1"/>
             </a:ext>
           </a:extLst>
         </p:spPr>
@@ -36683,7 +36731,7 @@
           </a:ln>
           <a:extLst>
             <a:ext uri="{C572A759-6A51-4108-AA02-DFA0A04FC94B}">
-              <ma14:wrappingTextBoxFlag xmlns="" xmlns:m="http://schemas.openxmlformats.org/officeDocument/2006/math" xmlns:a14="http://schemas.microsoft.com/office/drawing/2010/main" xmlns:ma14="http://schemas.microsoft.com/office/mac/drawingml/2011/main" val="1"/>
+              <ma14:wrappingTextBoxFlag xmlns:ma14="http://schemas.microsoft.com/office/mac/drawingml/2011/main" xmlns:a14="http://schemas.microsoft.com/office/drawing/2010/main" xmlns:m="http://schemas.openxmlformats.org/officeDocument/2006/math" xmlns="" val="1"/>
             </a:ext>
           </a:extLst>
         </p:spPr>
@@ -37465,7 +37513,7 @@
           </a:ln>
           <a:extLst>
             <a:ext uri="{C572A759-6A51-4108-AA02-DFA0A04FC94B}">
-              <ma14:wrappingTextBoxFlag xmlns="" xmlns:m="http://schemas.openxmlformats.org/officeDocument/2006/math" xmlns:a14="http://schemas.microsoft.com/office/drawing/2010/main" xmlns:ma14="http://schemas.microsoft.com/office/mac/drawingml/2011/main" val="1"/>
+              <ma14:wrappingTextBoxFlag xmlns:ma14="http://schemas.microsoft.com/office/mac/drawingml/2011/main" xmlns:a14="http://schemas.microsoft.com/office/drawing/2010/main" xmlns:m="http://schemas.openxmlformats.org/officeDocument/2006/math" xmlns="" val="1"/>
             </a:ext>
           </a:extLst>
         </p:spPr>
@@ -43066,7 +43114,7 @@
               <a:rPr lang="en-US" sz="2400" dirty="0">
                 <a:effectLst/>
               </a:rPr>
-              <a:t> is resolved).</a:t>
+              <a:t> is resolved or rejected).</a:t>
             </a:r>
           </a:p>
           <a:p>

</xml_diff>